<commit_message>
upraveny odkaz na spatnu vazbu v 4. prezentacii
</commit_message>
<xml_diff>
--- a/prednasky/04/Získavanie a prepájanie dát.pptx
+++ b/prednasky/04/Získavanie a prepájanie dát.pptx
@@ -33,9 +33,7 @@
     <p:sldId id="276" r:id="rId27"/>
     <p:sldId id="280" r:id="rId28"/>
     <p:sldId id="277" r:id="rId29"/>
-    <p:sldId id="278" r:id="rId30"/>
-    <p:sldId id="281" r:id="rId31"/>
-    <p:sldId id="279" r:id="rId32"/>
+    <p:sldId id="279" r:id="rId30"/>
   </p:sldIdLst>
   <p:sldSz cx="12192000" cy="6858000"/>
   <p:notesSz cx="6858000" cy="9144000"/>
@@ -273,7 +271,7 @@
           <a:p>
             <a:fld id="{0D57E5E0-9CB8-490D-B030-87550A7C4925}" type="datetimeFigureOut">
               <a:rPr lang="en-US" smtClean="0"/>
-              <a:t>10/16/2019</a:t>
+              <a:t>10/17/2019</a:t>
             </a:fld>
             <a:endParaRPr lang="en-US"/>
           </a:p>
@@ -443,7 +441,7 @@
           <a:p>
             <a:fld id="{0D57E5E0-9CB8-490D-B030-87550A7C4925}" type="datetimeFigureOut">
               <a:rPr lang="en-US" smtClean="0"/>
-              <a:t>10/16/2019</a:t>
+              <a:t>10/17/2019</a:t>
             </a:fld>
             <a:endParaRPr lang="en-US"/>
           </a:p>
@@ -623,7 +621,7 @@
           <a:p>
             <a:fld id="{0D57E5E0-9CB8-490D-B030-87550A7C4925}" type="datetimeFigureOut">
               <a:rPr lang="en-US" smtClean="0"/>
-              <a:t>10/16/2019</a:t>
+              <a:t>10/17/2019</a:t>
             </a:fld>
             <a:endParaRPr lang="en-US"/>
           </a:p>
@@ -793,7 +791,7 @@
           <a:p>
             <a:fld id="{0D57E5E0-9CB8-490D-B030-87550A7C4925}" type="datetimeFigureOut">
               <a:rPr lang="en-US" smtClean="0"/>
-              <a:t>10/16/2019</a:t>
+              <a:t>10/17/2019</a:t>
             </a:fld>
             <a:endParaRPr lang="en-US"/>
           </a:p>
@@ -1039,7 +1037,7 @@
           <a:p>
             <a:fld id="{0D57E5E0-9CB8-490D-B030-87550A7C4925}" type="datetimeFigureOut">
               <a:rPr lang="en-US" smtClean="0"/>
-              <a:t>10/16/2019</a:t>
+              <a:t>10/17/2019</a:t>
             </a:fld>
             <a:endParaRPr lang="en-US"/>
           </a:p>
@@ -1271,7 +1269,7 @@
           <a:p>
             <a:fld id="{0D57E5E0-9CB8-490D-B030-87550A7C4925}" type="datetimeFigureOut">
               <a:rPr lang="en-US" smtClean="0"/>
-              <a:t>10/16/2019</a:t>
+              <a:t>10/17/2019</a:t>
             </a:fld>
             <a:endParaRPr lang="en-US"/>
           </a:p>
@@ -1638,7 +1636,7 @@
           <a:p>
             <a:fld id="{0D57E5E0-9CB8-490D-B030-87550A7C4925}" type="datetimeFigureOut">
               <a:rPr lang="en-US" smtClean="0"/>
-              <a:t>10/16/2019</a:t>
+              <a:t>10/17/2019</a:t>
             </a:fld>
             <a:endParaRPr lang="en-US"/>
           </a:p>
@@ -1756,7 +1754,7 @@
           <a:p>
             <a:fld id="{0D57E5E0-9CB8-490D-B030-87550A7C4925}" type="datetimeFigureOut">
               <a:rPr lang="en-US" smtClean="0"/>
-              <a:t>10/16/2019</a:t>
+              <a:t>10/17/2019</a:t>
             </a:fld>
             <a:endParaRPr lang="en-US"/>
           </a:p>
@@ -1851,7 +1849,7 @@
           <a:p>
             <a:fld id="{0D57E5E0-9CB8-490D-B030-87550A7C4925}" type="datetimeFigureOut">
               <a:rPr lang="en-US" smtClean="0"/>
-              <a:t>10/16/2019</a:t>
+              <a:t>10/17/2019</a:t>
             </a:fld>
             <a:endParaRPr lang="en-US"/>
           </a:p>
@@ -2128,7 +2126,7 @@
           <a:p>
             <a:fld id="{0D57E5E0-9CB8-490D-B030-87550A7C4925}" type="datetimeFigureOut">
               <a:rPr lang="en-US" smtClean="0"/>
-              <a:t>10/16/2019</a:t>
+              <a:t>10/17/2019</a:t>
             </a:fld>
             <a:endParaRPr lang="en-US"/>
           </a:p>
@@ -2381,7 +2379,7 @@
           <a:p>
             <a:fld id="{0D57E5E0-9CB8-490D-B030-87550A7C4925}" type="datetimeFigureOut">
               <a:rPr lang="en-US" smtClean="0"/>
-              <a:t>10/16/2019</a:t>
+              <a:t>10/17/2019</a:t>
             </a:fld>
             <a:endParaRPr lang="en-US"/>
           </a:p>
@@ -2594,7 +2592,7 @@
           <a:p>
             <a:fld id="{0D57E5E0-9CB8-490D-B030-87550A7C4925}" type="datetimeFigureOut">
               <a:rPr lang="en-US" smtClean="0"/>
-              <a:t>10/16/2019</a:t>
+              <a:t>10/17/2019</a:t>
             </a:fld>
             <a:endParaRPr lang="en-US"/>
           </a:p>
@@ -3313,6 +3311,13 @@
   <p:clrMapOvr>
     <a:masterClrMapping/>
   </p:clrMapOvr>
+  <p:timing>
+    <p:tnLst>
+      <p:par>
+        <p:cTn id="1" dur="indefinite" restart="never" nodeType="tmRoot"/>
+      </p:par>
+    </p:tnLst>
+  </p:timing>
 </p:sld>
 </file>
 
@@ -3387,6 +3392,13 @@
   <p:clrMapOvr>
     <a:masterClrMapping/>
   </p:clrMapOvr>
+  <p:timing>
+    <p:tnLst>
+      <p:par>
+        <p:cTn id="1" dur="indefinite" restart="never" nodeType="tmRoot"/>
+      </p:par>
+    </p:tnLst>
+  </p:timing>
 </p:sld>
 </file>
 
@@ -3459,6 +3471,13 @@
   <p:clrMapOvr>
     <a:masterClrMapping/>
   </p:clrMapOvr>
+  <p:timing>
+    <p:tnLst>
+      <p:par>
+        <p:cTn id="1" dur="indefinite" restart="never" nodeType="tmRoot"/>
+      </p:par>
+    </p:tnLst>
+  </p:timing>
 </p:sld>
 </file>
 
@@ -3645,6 +3664,13 @@
   <p:clrMapOvr>
     <a:masterClrMapping/>
   </p:clrMapOvr>
+  <p:timing>
+    <p:tnLst>
+      <p:par>
+        <p:cTn id="1" dur="indefinite" restart="never" nodeType="tmRoot"/>
+      </p:par>
+    </p:tnLst>
+  </p:timing>
 </p:sld>
 </file>
 
@@ -3777,6 +3803,13 @@
   <p:clrMapOvr>
     <a:masterClrMapping/>
   </p:clrMapOvr>
+  <p:timing>
+    <p:tnLst>
+      <p:par>
+        <p:cTn id="1" dur="indefinite" restart="never" nodeType="tmRoot"/>
+      </p:par>
+    </p:tnLst>
+  </p:timing>
 </p:sld>
 </file>
 
@@ -3875,6 +3908,13 @@
   <p:clrMapOvr>
     <a:masterClrMapping/>
   </p:clrMapOvr>
+  <p:timing>
+    <p:tnLst>
+      <p:par>
+        <p:cTn id="1" dur="indefinite" restart="never" nodeType="tmRoot"/>
+      </p:par>
+    </p:tnLst>
+  </p:timing>
 </p:sld>
 </file>
 
@@ -4031,6 +4071,13 @@
   <p:clrMapOvr>
     <a:masterClrMapping/>
   </p:clrMapOvr>
+  <p:timing>
+    <p:tnLst>
+      <p:par>
+        <p:cTn id="1" dur="indefinite" restart="never" nodeType="tmRoot"/>
+      </p:par>
+    </p:tnLst>
+  </p:timing>
 </p:sld>
 </file>
 
@@ -4123,6 +4170,13 @@
   <p:clrMapOvr>
     <a:masterClrMapping/>
   </p:clrMapOvr>
+  <p:timing>
+    <p:tnLst>
+      <p:par>
+        <p:cTn id="1" dur="indefinite" restart="never" nodeType="tmRoot"/>
+      </p:par>
+    </p:tnLst>
+  </p:timing>
 </p:sld>
 </file>
 
@@ -4207,6 +4261,13 @@
   <p:clrMapOvr>
     <a:masterClrMapping/>
   </p:clrMapOvr>
+  <p:timing>
+    <p:tnLst>
+      <p:par>
+        <p:cTn id="1" dur="indefinite" restart="never" nodeType="tmRoot"/>
+      </p:par>
+    </p:tnLst>
+  </p:timing>
 </p:sld>
 </file>
 
@@ -4279,6 +4340,13 @@
   <p:clrMapOvr>
     <a:masterClrMapping/>
   </p:clrMapOvr>
+  <p:timing>
+    <p:tnLst>
+      <p:par>
+        <p:cTn id="1" dur="indefinite" restart="never" nodeType="tmRoot"/>
+      </p:par>
+    </p:tnLst>
+  </p:timing>
 </p:sld>
 </file>
 
@@ -4483,6 +4551,13 @@
   <p:clrMapOvr>
     <a:masterClrMapping/>
   </p:clrMapOvr>
+  <p:timing>
+    <p:tnLst>
+      <p:par>
+        <p:cTn id="1" dur="indefinite" restart="never" nodeType="tmRoot"/>
+      </p:par>
+    </p:tnLst>
+  </p:timing>
 </p:sld>
 </file>
 
@@ -4604,6 +4679,13 @@
   <p:clrMapOvr>
     <a:masterClrMapping/>
   </p:clrMapOvr>
+  <p:timing>
+    <p:tnLst>
+      <p:par>
+        <p:cTn id="1" dur="indefinite" restart="never" nodeType="tmRoot"/>
+      </p:par>
+    </p:tnLst>
+  </p:timing>
 </p:sld>
 </file>
 
@@ -6374,7 +6456,7 @@
       </p:grpSpPr>
       <p:sp>
         <p:nvSpPr>
-          <p:cNvPr id="2" name="Title 1"/>
+          <p:cNvPr id="6" name="Title 5"/>
           <p:cNvSpPr>
             <a:spLocks noGrp="1"/>
           </p:cNvSpPr>
@@ -6384,20 +6466,38 @@
         </p:nvSpPr>
         <p:spPr/>
         <p:txBody>
-          <a:bodyPr/>
-          <a:lstStyle/>
-          <a:p>
-            <a:r>
-              <a:rPr lang="sk-SK" dirty="0" smtClean="0"/>
-              <a:t>Projekt</a:t>
-            </a:r>
-            <a:endParaRPr lang="en-US" dirty="0"/>
-          </a:p>
-        </p:txBody>
-      </p:sp>
-      <p:sp>
-        <p:nvSpPr>
-          <p:cNvPr id="4" name="Text Placeholder 3"/>
+          <a:bodyPr>
+            <a:normAutofit/>
+          </a:bodyPr>
+          <a:lstStyle/>
+          <a:p>
+            <a:r>
+              <a:rPr lang="en-US" sz="5400" b="1" dirty="0" err="1"/>
+              <a:t>Spätná</a:t>
+            </a:r>
+            <a:r>
+              <a:rPr lang="en-US" sz="5400" b="1" dirty="0"/>
+              <a:t> </a:t>
+            </a:r>
+            <a:r>
+              <a:rPr lang="en-US" sz="5400" b="1" dirty="0" err="1"/>
+              <a:t>väzba</a:t>
+            </a:r>
+            <a:r>
+              <a:rPr lang="en-US" sz="5400" b="1" dirty="0"/>
+              <a:t>: </a:t>
+            </a:r>
+            <a:r>
+              <a:rPr lang="en-US" sz="5400" b="1" dirty="0" smtClean="0"/>
+              <a:t>https://tinyurl.com/iau2019-w04</a:t>
+            </a:r>
+            <a:endParaRPr lang="en-US" sz="5400" dirty="0"/>
+          </a:p>
+        </p:txBody>
+      </p:sp>
+      <p:sp>
+        <p:nvSpPr>
+          <p:cNvPr id="7" name="Text Placeholder 6"/>
           <p:cNvSpPr>
             <a:spLocks noGrp="1"/>
           </p:cNvSpPr>
@@ -6417,7 +6517,7 @@
     </p:spTree>
     <p:extLst>
       <p:ext uri="{BB962C8B-B14F-4D97-AF65-F5344CB8AC3E}">
-        <p14:creationId xmlns:p14="http://schemas.microsoft.com/office/powerpoint/2010/main" val="1882534046"/>
+        <p14:creationId xmlns:p14="http://schemas.microsoft.com/office/powerpoint/2010/main" val="3831600161"/>
       </p:ext>
     </p:extLst>
   </p:cSld>
@@ -6543,307 +6643,6 @@
   <p:clrMapOvr>
     <a:masterClrMapping/>
   </p:clrMapOvr>
-</p:sld>
-</file>
-
-<file path=ppt/slides/slide30.xml><?xml version="1.0" encoding="utf-8"?>
-<p:sld xmlns:a="http://schemas.openxmlformats.org/drawingml/2006/main" xmlns:r="http://schemas.openxmlformats.org/officeDocument/2006/relationships" xmlns:p="http://schemas.openxmlformats.org/presentationml/2006/main">
-  <p:cSld>
-    <p:spTree>
-      <p:nvGrpSpPr>
-        <p:cNvPr id="1" name=""/>
-        <p:cNvGrpSpPr/>
-        <p:nvPr/>
-      </p:nvGrpSpPr>
-      <p:grpSpPr>
-        <a:xfrm>
-          <a:off x="0" y="0"/>
-          <a:ext cx="0" cy="0"/>
-          <a:chOff x="0" y="0"/>
-          <a:chExt cx="0" cy="0"/>
-        </a:xfrm>
-      </p:grpSpPr>
-      <p:sp>
-        <p:nvSpPr>
-          <p:cNvPr id="4" name="Title 3"/>
-          <p:cNvSpPr>
-            <a:spLocks noGrp="1"/>
-          </p:cNvSpPr>
-          <p:nvPr>
-            <p:ph type="title"/>
-          </p:nvPr>
-        </p:nvSpPr>
-        <p:spPr/>
-        <p:txBody>
-          <a:bodyPr/>
-          <a:lstStyle/>
-          <a:p>
-            <a:r>
-              <a:rPr lang="en-US" dirty="0" err="1" smtClean="0"/>
-              <a:t>Datasety</a:t>
-            </a:r>
-            <a:endParaRPr lang="en-US" dirty="0"/>
-          </a:p>
-        </p:txBody>
-      </p:sp>
-      <p:sp>
-        <p:nvSpPr>
-          <p:cNvPr id="5" name="Content Placeholder 4"/>
-          <p:cNvSpPr>
-            <a:spLocks noGrp="1"/>
-          </p:cNvSpPr>
-          <p:nvPr>
-            <p:ph idx="1"/>
-          </p:nvPr>
-        </p:nvSpPr>
-        <p:spPr/>
-        <p:txBody>
-          <a:bodyPr>
-            <a:normAutofit fontScale="85000" lnSpcReduction="20000"/>
-          </a:bodyPr>
-          <a:lstStyle/>
-          <a:p>
-            <a:pPr marL="0" indent="0">
-              <a:buNone/>
-            </a:pPr>
-            <a:r>
-              <a:rPr lang="en-US" dirty="0" smtClean="0"/>
-              <a:t>Je </a:t>
-            </a:r>
-            <a:r>
-              <a:rPr lang="en-US" dirty="0" err="1" smtClean="0"/>
-              <a:t>vytvoren</a:t>
-            </a:r>
-            <a:r>
-              <a:rPr lang="sk-SK" dirty="0" smtClean="0"/>
-              <a:t>ý</a:t>
-            </a:r>
-            <a:r>
-              <a:rPr lang="en-US" dirty="0" err="1" smtClean="0"/>
-              <a:t>ch</a:t>
-            </a:r>
-            <a:r>
-              <a:rPr lang="en-US" dirty="0" smtClean="0"/>
-              <a:t> 100 </a:t>
-            </a:r>
-            <a:r>
-              <a:rPr lang="sk-SK" dirty="0" err="1" smtClean="0"/>
-              <a:t>datasetov</a:t>
-            </a:r>
-            <a:r>
-              <a:rPr lang="sk-SK" dirty="0" smtClean="0"/>
-              <a:t>. Zapíšte svoji dvojicu k jednému z nich v tomto dokumente</a:t>
-            </a:r>
-            <a:endParaRPr lang="en-US" dirty="0" smtClean="0"/>
-          </a:p>
-          <a:p>
-            <a:r>
-              <a:rPr lang="en-US" dirty="0" smtClean="0">
-                <a:hlinkClick r:id="rId2"/>
-              </a:rPr>
-              <a:t>https://tinyurl.com/iau-vyber-datasetov</a:t>
-            </a:r>
-            <a:endParaRPr lang="en-US" dirty="0" smtClean="0"/>
-          </a:p>
-          <a:p>
-            <a:endParaRPr lang="sk-SK" dirty="0" smtClean="0"/>
-          </a:p>
-          <a:p>
-            <a:pPr marL="0" indent="0">
-              <a:buNone/>
-            </a:pPr>
-            <a:r>
-              <a:rPr lang="sk-SK" dirty="0" smtClean="0"/>
-              <a:t>Stiahnite si </a:t>
-            </a:r>
-            <a:r>
-              <a:rPr lang="sk-SK" dirty="0" err="1" smtClean="0"/>
-              <a:t>dataset</a:t>
-            </a:r>
-            <a:r>
-              <a:rPr lang="sk-SK" dirty="0" smtClean="0"/>
-              <a:t> pod zvoleným číslom tu</a:t>
-            </a:r>
-            <a:endParaRPr lang="en-US" dirty="0" smtClean="0"/>
-          </a:p>
-          <a:p>
-            <a:r>
-              <a:rPr lang="en-US" dirty="0" smtClean="0">
-                <a:hlinkClick r:id="rId3"/>
-              </a:rPr>
-              <a:t>https://tinyurl.com/iau-data</a:t>
-            </a:r>
-            <a:endParaRPr lang="en-US" dirty="0" smtClean="0"/>
-          </a:p>
-          <a:p>
-            <a:endParaRPr lang="sk-SK" dirty="0" smtClean="0"/>
-          </a:p>
-          <a:p>
-            <a:pPr marL="0" indent="0">
-              <a:buNone/>
-            </a:pPr>
-            <a:r>
-              <a:rPr lang="sk-SK" dirty="0" smtClean="0"/>
-              <a:t>Každý </a:t>
-            </a:r>
-            <a:r>
-              <a:rPr lang="sk-SK" dirty="0" err="1" smtClean="0"/>
-              <a:t>dataset</a:t>
-            </a:r>
-            <a:r>
-              <a:rPr lang="sk-SK" dirty="0" smtClean="0"/>
-              <a:t> je zložený zo 4 súborov. 2 na trénovanie a 2 na validáciu. Majú rovnakú štruktúru, len iné záznamy. </a:t>
-            </a:r>
-            <a:r>
-              <a:rPr lang="sk-SK" dirty="0" err="1" smtClean="0"/>
-              <a:t>Predikovaná</a:t>
-            </a:r>
-            <a:r>
-              <a:rPr lang="sk-SK" dirty="0" smtClean="0"/>
-              <a:t> hodnota je v stĺpci </a:t>
-            </a:r>
-            <a:r>
-              <a:rPr lang="sk-SK" i="1" dirty="0" err="1" smtClean="0"/>
-              <a:t>class</a:t>
-            </a:r>
-            <a:r>
-              <a:rPr lang="sk-SK" i="1" dirty="0" smtClean="0"/>
-              <a:t>.</a:t>
-            </a:r>
-          </a:p>
-          <a:p>
-            <a:pPr marL="0" indent="0">
-              <a:buNone/>
-            </a:pPr>
-            <a:endParaRPr lang="sk-SK" dirty="0"/>
-          </a:p>
-          <a:p>
-            <a:pPr marL="0" indent="0">
-              <a:buNone/>
-            </a:pPr>
-            <a:r>
-              <a:rPr lang="sk-SK" dirty="0" smtClean="0">
-                <a:hlinkClick r:id="rId4"/>
-              </a:rPr>
-              <a:t>https://github.com/sevo/IAU-2018-2019/blob/master/podmienky_absolvovania_a_projekt.pdf</a:t>
-            </a:r>
-            <a:endParaRPr lang="sk-SK" dirty="0" smtClean="0"/>
-          </a:p>
-          <a:p>
-            <a:pPr marL="0" indent="0">
-              <a:buNone/>
-            </a:pPr>
-            <a:endParaRPr lang="sk-SK" dirty="0" smtClean="0"/>
-          </a:p>
-        </p:txBody>
-      </p:sp>
-    </p:spTree>
-    <p:extLst>
-      <p:ext uri="{BB962C8B-B14F-4D97-AF65-F5344CB8AC3E}">
-        <p14:creationId xmlns:p14="http://schemas.microsoft.com/office/powerpoint/2010/main" val="441086481"/>
-      </p:ext>
-    </p:extLst>
-  </p:cSld>
-  <p:clrMapOvr>
-    <a:masterClrMapping/>
-  </p:clrMapOvr>
-  <p:timing>
-    <p:tnLst>
-      <p:par>
-        <p:cTn id="1" dur="indefinite" restart="never" nodeType="tmRoot"/>
-      </p:par>
-    </p:tnLst>
-  </p:timing>
-</p:sld>
-</file>
-
-<file path=ppt/slides/slide31.xml><?xml version="1.0" encoding="utf-8"?>
-<p:sld xmlns:a="http://schemas.openxmlformats.org/drawingml/2006/main" xmlns:r="http://schemas.openxmlformats.org/officeDocument/2006/relationships" xmlns:p="http://schemas.openxmlformats.org/presentationml/2006/main">
-  <p:cSld>
-    <p:spTree>
-      <p:nvGrpSpPr>
-        <p:cNvPr id="1" name=""/>
-        <p:cNvGrpSpPr/>
-        <p:nvPr/>
-      </p:nvGrpSpPr>
-      <p:grpSpPr>
-        <a:xfrm>
-          <a:off x="0" y="0"/>
-          <a:ext cx="0" cy="0"/>
-          <a:chOff x="0" y="0"/>
-          <a:chExt cx="0" cy="0"/>
-        </a:xfrm>
-      </p:grpSpPr>
-      <p:sp>
-        <p:nvSpPr>
-          <p:cNvPr id="6" name="Title 5"/>
-          <p:cNvSpPr>
-            <a:spLocks noGrp="1"/>
-          </p:cNvSpPr>
-          <p:nvPr>
-            <p:ph type="title"/>
-          </p:nvPr>
-        </p:nvSpPr>
-        <p:spPr/>
-        <p:txBody>
-          <a:bodyPr>
-            <a:normAutofit/>
-          </a:bodyPr>
-          <a:lstStyle/>
-          <a:p>
-            <a:r>
-              <a:rPr lang="en-US" sz="5400" b="1" dirty="0" err="1"/>
-              <a:t>Spätná</a:t>
-            </a:r>
-            <a:r>
-              <a:rPr lang="en-US" sz="5400" b="1" dirty="0"/>
-              <a:t> </a:t>
-            </a:r>
-            <a:r>
-              <a:rPr lang="en-US" sz="5400" b="1" dirty="0" err="1"/>
-              <a:t>väzba</a:t>
-            </a:r>
-            <a:r>
-              <a:rPr lang="en-US" sz="5400" b="1" dirty="0"/>
-              <a:t>: </a:t>
-            </a:r>
-            <a:r>
-              <a:rPr lang="en-US" sz="5400" b="1" dirty="0" smtClean="0"/>
-              <a:t>tinyurl.com/iau2018-19</a:t>
-            </a:r>
-            <a:endParaRPr lang="en-US" sz="5400" dirty="0"/>
-          </a:p>
-        </p:txBody>
-      </p:sp>
-      <p:sp>
-        <p:nvSpPr>
-          <p:cNvPr id="7" name="Text Placeholder 6"/>
-          <p:cNvSpPr>
-            <a:spLocks noGrp="1"/>
-          </p:cNvSpPr>
-          <p:nvPr>
-            <p:ph type="body" idx="1"/>
-          </p:nvPr>
-        </p:nvSpPr>
-        <p:spPr/>
-        <p:txBody>
-          <a:bodyPr/>
-          <a:lstStyle/>
-          <a:p>
-            <a:endParaRPr lang="en-US"/>
-          </a:p>
-        </p:txBody>
-      </p:sp>
-    </p:spTree>
-    <p:extLst>
-      <p:ext uri="{BB962C8B-B14F-4D97-AF65-F5344CB8AC3E}">
-        <p14:creationId xmlns:p14="http://schemas.microsoft.com/office/powerpoint/2010/main" val="3831600161"/>
-      </p:ext>
-    </p:extLst>
-  </p:cSld>
-  <p:clrMapOvr>
-    <a:masterClrMapping/>
-  </p:clrMapOvr>
   <p:timing>
     <p:tnLst>
       <p:par>
@@ -6983,6 +6782,13 @@
   <p:clrMapOvr>
     <a:masterClrMapping/>
   </p:clrMapOvr>
+  <p:timing>
+    <p:tnLst>
+      <p:par>
+        <p:cTn id="1" dur="indefinite" restart="never" nodeType="tmRoot"/>
+      </p:par>
+    </p:tnLst>
+  </p:timing>
 </p:sld>
 </file>
 
@@ -7203,6 +7009,13 @@
   <p:clrMapOvr>
     <a:masterClrMapping/>
   </p:clrMapOvr>
+  <p:timing>
+    <p:tnLst>
+      <p:par>
+        <p:cTn id="1" dur="indefinite" restart="never" nodeType="tmRoot"/>
+      </p:par>
+    </p:tnLst>
+  </p:timing>
 </p:sld>
 </file>
 
@@ -7579,6 +7392,13 @@
   <p:clrMapOvr>
     <a:masterClrMapping/>
   </p:clrMapOvr>
+  <p:timing>
+    <p:tnLst>
+      <p:par>
+        <p:cTn id="1" dur="indefinite" restart="never" nodeType="tmRoot"/>
+      </p:par>
+    </p:tnLst>
+  </p:timing>
 </p:sld>
 </file>
 
@@ -7667,6 +7487,13 @@
   <p:clrMapOvr>
     <a:masterClrMapping/>
   </p:clrMapOvr>
+  <p:timing>
+    <p:tnLst>
+      <p:par>
+        <p:cTn id="1" dur="indefinite" restart="never" nodeType="tmRoot"/>
+      </p:par>
+    </p:tnLst>
+  </p:timing>
 </p:sld>
 </file>
 
@@ -7846,6 +7673,13 @@
   <p:clrMapOvr>
     <a:masterClrMapping/>
   </p:clrMapOvr>
+  <p:timing>
+    <p:tnLst>
+      <p:par>
+        <p:cTn id="1" dur="indefinite" restart="never" nodeType="tmRoot"/>
+      </p:par>
+    </p:tnLst>
+  </p:timing>
 </p:sld>
 </file>
 
@@ -7973,6 +7807,13 @@
   <p:clrMapOvr>
     <a:masterClrMapping/>
   </p:clrMapOvr>
+  <p:timing>
+    <p:tnLst>
+      <p:par>
+        <p:cTn id="1" dur="indefinite" restart="never" nodeType="tmRoot"/>
+      </p:par>
+    </p:tnLst>
+  </p:timing>
 </p:sld>
 </file>
 

</xml_diff>

<commit_message>
odstranenie otazok na skusku, nech maju studenti na prednaske vyhodu
</commit_message>
<xml_diff>
--- a/prednasky/04/Získavanie a prepájanie dát.pptx
+++ b/prednasky/04/Získavanie a prepájanie dát.pptx
@@ -9,31 +9,29 @@
     <p:sldId id="257" r:id="rId3"/>
     <p:sldId id="284" r:id="rId4"/>
     <p:sldId id="283" r:id="rId5"/>
-    <p:sldId id="282" r:id="rId6"/>
-    <p:sldId id="285" r:id="rId7"/>
-    <p:sldId id="286" r:id="rId8"/>
-    <p:sldId id="269" r:id="rId9"/>
-    <p:sldId id="259" r:id="rId10"/>
-    <p:sldId id="270" r:id="rId11"/>
-    <p:sldId id="271" r:id="rId12"/>
-    <p:sldId id="258" r:id="rId13"/>
-    <p:sldId id="264" r:id="rId14"/>
-    <p:sldId id="265" r:id="rId15"/>
-    <p:sldId id="273" r:id="rId16"/>
-    <p:sldId id="272" r:id="rId17"/>
-    <p:sldId id="274" r:id="rId18"/>
-    <p:sldId id="275" r:id="rId19"/>
-    <p:sldId id="266" r:id="rId20"/>
-    <p:sldId id="260" r:id="rId21"/>
-    <p:sldId id="261" r:id="rId22"/>
-    <p:sldId id="262" r:id="rId23"/>
-    <p:sldId id="263" r:id="rId24"/>
-    <p:sldId id="267" r:id="rId25"/>
-    <p:sldId id="268" r:id="rId26"/>
-    <p:sldId id="276" r:id="rId27"/>
-    <p:sldId id="280" r:id="rId28"/>
-    <p:sldId id="277" r:id="rId29"/>
-    <p:sldId id="279" r:id="rId30"/>
+    <p:sldId id="286" r:id="rId6"/>
+    <p:sldId id="269" r:id="rId7"/>
+    <p:sldId id="259" r:id="rId8"/>
+    <p:sldId id="270" r:id="rId9"/>
+    <p:sldId id="271" r:id="rId10"/>
+    <p:sldId id="258" r:id="rId11"/>
+    <p:sldId id="264" r:id="rId12"/>
+    <p:sldId id="265" r:id="rId13"/>
+    <p:sldId id="273" r:id="rId14"/>
+    <p:sldId id="272" r:id="rId15"/>
+    <p:sldId id="274" r:id="rId16"/>
+    <p:sldId id="275" r:id="rId17"/>
+    <p:sldId id="266" r:id="rId18"/>
+    <p:sldId id="260" r:id="rId19"/>
+    <p:sldId id="261" r:id="rId20"/>
+    <p:sldId id="262" r:id="rId21"/>
+    <p:sldId id="263" r:id="rId22"/>
+    <p:sldId id="267" r:id="rId23"/>
+    <p:sldId id="268" r:id="rId24"/>
+    <p:sldId id="276" r:id="rId25"/>
+    <p:sldId id="280" r:id="rId26"/>
+    <p:sldId id="277" r:id="rId27"/>
+    <p:sldId id="279" r:id="rId28"/>
   </p:sldIdLst>
   <p:sldSz cx="12192000" cy="6858000"/>
   <p:notesSz cx="6858000" cy="9144000"/>
@@ -271,7 +269,7 @@
           <a:p>
             <a:fld id="{0D57E5E0-9CB8-490D-B030-87550A7C4925}" type="datetimeFigureOut">
               <a:rPr lang="en-US" smtClean="0"/>
-              <a:t>10/17/2019</a:t>
+              <a:t>11/7/2019</a:t>
             </a:fld>
             <a:endParaRPr lang="en-US"/>
           </a:p>
@@ -441,7 +439,7 @@
           <a:p>
             <a:fld id="{0D57E5E0-9CB8-490D-B030-87550A7C4925}" type="datetimeFigureOut">
               <a:rPr lang="en-US" smtClean="0"/>
-              <a:t>10/17/2019</a:t>
+              <a:t>11/7/2019</a:t>
             </a:fld>
             <a:endParaRPr lang="en-US"/>
           </a:p>
@@ -621,7 +619,7 @@
           <a:p>
             <a:fld id="{0D57E5E0-9CB8-490D-B030-87550A7C4925}" type="datetimeFigureOut">
               <a:rPr lang="en-US" smtClean="0"/>
-              <a:t>10/17/2019</a:t>
+              <a:t>11/7/2019</a:t>
             </a:fld>
             <a:endParaRPr lang="en-US"/>
           </a:p>
@@ -791,7 +789,7 @@
           <a:p>
             <a:fld id="{0D57E5E0-9CB8-490D-B030-87550A7C4925}" type="datetimeFigureOut">
               <a:rPr lang="en-US" smtClean="0"/>
-              <a:t>10/17/2019</a:t>
+              <a:t>11/7/2019</a:t>
             </a:fld>
             <a:endParaRPr lang="en-US"/>
           </a:p>
@@ -1037,7 +1035,7 @@
           <a:p>
             <a:fld id="{0D57E5E0-9CB8-490D-B030-87550A7C4925}" type="datetimeFigureOut">
               <a:rPr lang="en-US" smtClean="0"/>
-              <a:t>10/17/2019</a:t>
+              <a:t>11/7/2019</a:t>
             </a:fld>
             <a:endParaRPr lang="en-US"/>
           </a:p>
@@ -1269,7 +1267,7 @@
           <a:p>
             <a:fld id="{0D57E5E0-9CB8-490D-B030-87550A7C4925}" type="datetimeFigureOut">
               <a:rPr lang="en-US" smtClean="0"/>
-              <a:t>10/17/2019</a:t>
+              <a:t>11/7/2019</a:t>
             </a:fld>
             <a:endParaRPr lang="en-US"/>
           </a:p>
@@ -1636,7 +1634,7 @@
           <a:p>
             <a:fld id="{0D57E5E0-9CB8-490D-B030-87550A7C4925}" type="datetimeFigureOut">
               <a:rPr lang="en-US" smtClean="0"/>
-              <a:t>10/17/2019</a:t>
+              <a:t>11/7/2019</a:t>
             </a:fld>
             <a:endParaRPr lang="en-US"/>
           </a:p>
@@ -1754,7 +1752,7 @@
           <a:p>
             <a:fld id="{0D57E5E0-9CB8-490D-B030-87550A7C4925}" type="datetimeFigureOut">
               <a:rPr lang="en-US" smtClean="0"/>
-              <a:t>10/17/2019</a:t>
+              <a:t>11/7/2019</a:t>
             </a:fld>
             <a:endParaRPr lang="en-US"/>
           </a:p>
@@ -1849,7 +1847,7 @@
           <a:p>
             <a:fld id="{0D57E5E0-9CB8-490D-B030-87550A7C4925}" type="datetimeFigureOut">
               <a:rPr lang="en-US" smtClean="0"/>
-              <a:t>10/17/2019</a:t>
+              <a:t>11/7/2019</a:t>
             </a:fld>
             <a:endParaRPr lang="en-US"/>
           </a:p>
@@ -2126,7 +2124,7 @@
           <a:p>
             <a:fld id="{0D57E5E0-9CB8-490D-B030-87550A7C4925}" type="datetimeFigureOut">
               <a:rPr lang="en-US" smtClean="0"/>
-              <a:t>10/17/2019</a:t>
+              <a:t>11/7/2019</a:t>
             </a:fld>
             <a:endParaRPr lang="en-US"/>
           </a:p>
@@ -2379,7 +2377,7 @@
           <a:p>
             <a:fld id="{0D57E5E0-9CB8-490D-B030-87550A7C4925}" type="datetimeFigureOut">
               <a:rPr lang="en-US" smtClean="0"/>
-              <a:t>10/17/2019</a:t>
+              <a:t>11/7/2019</a:t>
             </a:fld>
             <a:endParaRPr lang="en-US"/>
           </a:p>
@@ -2592,7 +2590,7 @@
           <a:p>
             <a:fld id="{0D57E5E0-9CB8-490D-B030-87550A7C4925}" type="datetimeFigureOut">
               <a:rPr lang="en-US" smtClean="0"/>
-              <a:t>10/17/2019</a:t>
+              <a:t>11/7/2019</a:t>
             </a:fld>
             <a:endParaRPr lang="en-US"/>
           </a:p>
@@ -3112,199 +3110,36 @@
           <a:lstStyle/>
           <a:p>
             <a:r>
-              <a:rPr lang="sk-SK" dirty="0" err="1" smtClean="0"/>
-              <a:t>Star</a:t>
-            </a:r>
-            <a:r>
-              <a:rPr lang="sk-SK" dirty="0" smtClean="0"/>
-              <a:t>-schéma</a:t>
+              <a:rPr lang="sk-SK" dirty="0" smtClean="0"/>
+              <a:t>Zdroje údajov</a:t>
             </a:r>
             <a:endParaRPr lang="en-US" dirty="0"/>
           </a:p>
         </p:txBody>
       </p:sp>
-      <p:pic>
-        <p:nvPicPr>
-          <p:cNvPr id="1026" name="Picture 2" descr="https://upload.wikimedia.org/wikipedia/en/f/fe/Star-schema-example.png"/>
-          <p:cNvPicPr>
-            <a:picLocks noChangeAspect="1" noChangeArrowheads="1"/>
-          </p:cNvPicPr>
-          <p:nvPr/>
-        </p:nvPicPr>
-        <p:blipFill>
-          <a:blip r:embed="rId2">
-            <a:extLst>
-              <a:ext uri="{28A0092B-C50C-407E-A947-70E740481C1C}">
-                <a14:useLocalDpi xmlns:a14="http://schemas.microsoft.com/office/drawing/2010/main" val="0"/>
-              </a:ext>
-            </a:extLst>
-          </a:blip>
-          <a:srcRect/>
-          <a:stretch>
-            <a:fillRect/>
-          </a:stretch>
-        </p:blipFill>
-        <p:spPr bwMode="auto">
-          <a:xfrm>
-            <a:off x="4515926" y="1676849"/>
-            <a:ext cx="7676074" cy="4648890"/>
-          </a:xfrm>
-          <a:prstGeom prst="rect">
-            <a:avLst/>
-          </a:prstGeom>
-          <a:noFill/>
-          <a:extLst>
-            <a:ext uri="{909E8E84-426E-40DD-AFC4-6F175D3DCCD1}">
-              <a14:hiddenFill xmlns:a14="http://schemas.microsoft.com/office/drawing/2010/main">
-                <a:solidFill>
-                  <a:srgbClr val="FFFFFF"/>
-                </a:solidFill>
-              </a14:hiddenFill>
-            </a:ext>
-          </a:extLst>
-        </p:spPr>
-      </p:pic>
-      <p:sp>
-        <p:nvSpPr>
-          <p:cNvPr id="5" name="Content Placeholder 2"/>
-          <p:cNvSpPr>
-            <a:spLocks noGrp="1"/>
-          </p:cNvSpPr>
-          <p:nvPr>
-            <p:ph idx="1"/>
-          </p:nvPr>
-        </p:nvSpPr>
-        <p:spPr>
-          <a:xfrm>
-            <a:off x="838200" y="1825625"/>
-            <a:ext cx="3783496" cy="4351338"/>
-          </a:xfrm>
-        </p:spPr>
-        <p:txBody>
-          <a:bodyPr>
-            <a:normAutofit/>
-          </a:bodyPr>
-          <a:lstStyle/>
-          <a:p>
-            <a:r>
-              <a:rPr lang="sk-SK" sz="2400" dirty="0" smtClean="0"/>
-              <a:t>Tabuľka faktov a dimenzií</a:t>
-            </a:r>
-          </a:p>
-          <a:p>
-            <a:r>
-              <a:rPr lang="sk-SK" sz="2400" dirty="0" smtClean="0"/>
-              <a:t>Dopyty v jednotnej forme (</a:t>
-            </a:r>
-            <a:r>
-              <a:rPr lang="sk-SK" sz="2400" dirty="0" err="1" smtClean="0"/>
-              <a:t>select</a:t>
-            </a:r>
-            <a:r>
-              <a:rPr lang="sk-SK" sz="2400" dirty="0" smtClean="0"/>
-              <a:t> + </a:t>
-            </a:r>
-            <a:r>
-              <a:rPr lang="sk-SK" sz="2400" dirty="0" err="1" smtClean="0"/>
-              <a:t>inner</a:t>
-            </a:r>
-            <a:r>
-              <a:rPr lang="sk-SK" sz="2400" dirty="0" smtClean="0"/>
-              <a:t> </a:t>
-            </a:r>
-            <a:r>
-              <a:rPr lang="sk-SK" sz="2400" dirty="0" err="1" smtClean="0"/>
-              <a:t>join</a:t>
-            </a:r>
-            <a:r>
-              <a:rPr lang="sk-SK" sz="2400" dirty="0" smtClean="0"/>
-              <a:t> + </a:t>
-            </a:r>
-            <a:r>
-              <a:rPr lang="sk-SK" sz="2400" dirty="0" err="1" smtClean="0"/>
-              <a:t>where</a:t>
-            </a:r>
-            <a:r>
-              <a:rPr lang="sk-SK" sz="2400" dirty="0" smtClean="0"/>
-              <a:t> + </a:t>
-            </a:r>
-            <a:r>
-              <a:rPr lang="sk-SK" sz="2400" dirty="0" err="1" smtClean="0"/>
-              <a:t>group</a:t>
-            </a:r>
-            <a:r>
-              <a:rPr lang="sk-SK" sz="2400" dirty="0" smtClean="0"/>
-              <a:t> by + </a:t>
-            </a:r>
-            <a:r>
-              <a:rPr lang="sk-SK" sz="2400" dirty="0" err="1" smtClean="0"/>
-              <a:t>agg</a:t>
-            </a:r>
-            <a:r>
-              <a:rPr lang="sk-SK" sz="2400" dirty="0" smtClean="0"/>
-              <a:t>)</a:t>
-            </a:r>
-          </a:p>
-          <a:p>
-            <a:r>
-              <a:rPr lang="sk-SK" sz="2400" dirty="0" smtClean="0"/>
-              <a:t>Šetrí miesto a dá sa pomerne rýchlo vyhodnocovať</a:t>
-            </a:r>
-          </a:p>
-          <a:p>
-            <a:r>
-              <a:rPr lang="sk-SK" sz="2400" dirty="0" smtClean="0"/>
-              <a:t>=&gt; </a:t>
-            </a:r>
-            <a:r>
-              <a:rPr lang="sk-SK" sz="2400" dirty="0" err="1" smtClean="0"/>
-              <a:t>Snowflake</a:t>
-            </a:r>
-            <a:r>
-              <a:rPr lang="sk-SK" sz="2400" dirty="0" smtClean="0"/>
-              <a:t> schéma</a:t>
-            </a:r>
-            <a:endParaRPr lang="en-US" sz="2400" dirty="0"/>
-          </a:p>
-        </p:txBody>
-      </p:sp>
-      <p:sp>
-        <p:nvSpPr>
-          <p:cNvPr id="4" name="Rectangle 3"/>
-          <p:cNvSpPr/>
-          <p:nvPr/>
-        </p:nvSpPr>
-        <p:spPr>
-          <a:xfrm>
-            <a:off x="4621696" y="6325739"/>
-            <a:ext cx="5229060" cy="369332"/>
-          </a:xfrm>
-          <a:prstGeom prst="rect">
-            <a:avLst/>
-          </a:prstGeom>
-        </p:spPr>
-        <p:txBody>
-          <a:bodyPr wrap="none">
-            <a:spAutoFit/>
-          </a:bodyPr>
-          <a:lstStyle/>
-          <a:p>
-            <a:r>
-              <a:rPr lang="sk-SK" dirty="0" smtClean="0"/>
-              <a:t>Zdroj obr.: </a:t>
-            </a:r>
-            <a:r>
-              <a:rPr lang="en-US" dirty="0" smtClean="0"/>
-              <a:t>https://en.wikipedia.org/wiki/Star_schema</a:t>
-            </a:r>
-            <a:endParaRPr lang="en-US" dirty="0"/>
+      <p:sp>
+        <p:nvSpPr>
+          <p:cNvPr id="4" name="Text Placeholder 3"/>
+          <p:cNvSpPr>
+            <a:spLocks noGrp="1"/>
+          </p:cNvSpPr>
+          <p:nvPr>
+            <p:ph type="body" idx="1"/>
+          </p:nvPr>
+        </p:nvSpPr>
+        <p:spPr/>
+        <p:txBody>
+          <a:bodyPr/>
+          <a:lstStyle/>
+          <a:p>
+            <a:endParaRPr lang="en-US"/>
           </a:p>
         </p:txBody>
       </p:sp>
     </p:spTree>
     <p:extLst>
       <p:ext uri="{BB962C8B-B14F-4D97-AF65-F5344CB8AC3E}">
-        <p14:creationId xmlns:p14="http://schemas.microsoft.com/office/powerpoint/2010/main" val="476748615"/>
+        <p14:creationId xmlns:p14="http://schemas.microsoft.com/office/powerpoint/2010/main" val="2121532146"/>
       </p:ext>
     </p:extLst>
   </p:cSld>
@@ -3340,7 +3175,7 @@
       </p:grpSpPr>
       <p:sp>
         <p:nvSpPr>
-          <p:cNvPr id="4" name="Title 3"/>
+          <p:cNvPr id="2" name="Title 1"/>
           <p:cNvSpPr>
             <a:spLocks noGrp="1"/>
           </p:cNvSpPr>
@@ -3350,16 +3185,22 @@
         </p:nvSpPr>
         <p:spPr/>
         <p:txBody>
-          <a:bodyPr>
-            <a:normAutofit/>
-          </a:bodyPr>
-          <a:lstStyle/>
-          <a:p>
-            <a:r>
-              <a:rPr lang="sk-SK" sz="4400" dirty="0" smtClean="0"/>
-              <a:t>My ale teraz zostaneme na úrovni niekoľko málo tabuliek</a:t>
-            </a:r>
-            <a:endParaRPr lang="en-US" sz="4400" dirty="0"/>
+          <a:bodyPr/>
+          <a:lstStyle/>
+          <a:p>
+            <a:r>
+              <a:rPr lang="sk-SK" dirty="0" smtClean="0"/>
+              <a:t>Pekne pripravené </a:t>
+            </a:r>
+            <a:r>
+              <a:rPr lang="sk-SK" dirty="0" err="1" smtClean="0"/>
+              <a:t>datasety</a:t>
+            </a:r>
+            <a:r>
+              <a:rPr lang="sk-SK" dirty="0" smtClean="0"/>
+              <a:t> na prácu</a:t>
+            </a:r>
+            <a:endParaRPr lang="en-US" dirty="0"/>
           </a:p>
         </p:txBody>
       </p:sp>
@@ -3370,13 +3211,119 @@
             <a:spLocks noGrp="1"/>
           </p:cNvSpPr>
           <p:nvPr>
-            <p:ph type="body" idx="1"/>
-          </p:nvPr>
-        </p:nvSpPr>
-        <p:spPr/>
-        <p:txBody>
-          <a:bodyPr/>
-          <a:lstStyle/>
+            <p:ph idx="1"/>
+          </p:nvPr>
+        </p:nvSpPr>
+        <p:spPr/>
+        <p:txBody>
+          <a:bodyPr/>
+          <a:lstStyle/>
+          <a:p>
+            <a:r>
+              <a:rPr lang="sk-SK" dirty="0" smtClean="0"/>
+              <a:t>UCI - </a:t>
+            </a:r>
+            <a:r>
+              <a:rPr lang="sk-SK" dirty="0" smtClean="0">
+                <a:hlinkClick r:id="rId2"/>
+              </a:rPr>
+              <a:t>http://archive.ics.uci.edu/ml/index.php</a:t>
+            </a:r>
+            <a:endParaRPr lang="sk-SK" dirty="0" smtClean="0"/>
+          </a:p>
+          <a:p>
+            <a:r>
+              <a:rPr lang="sk-SK" dirty="0" err="1" smtClean="0"/>
+              <a:t>Kaggle</a:t>
+            </a:r>
+            <a:r>
+              <a:rPr lang="sk-SK" dirty="0" smtClean="0"/>
+              <a:t> </a:t>
+            </a:r>
+            <a:r>
+              <a:rPr lang="sk-SK" dirty="0" err="1" smtClean="0"/>
+              <a:t>Datasets</a:t>
+            </a:r>
+            <a:r>
+              <a:rPr lang="sk-SK" dirty="0" smtClean="0"/>
+              <a:t> - </a:t>
+            </a:r>
+            <a:r>
+              <a:rPr lang="sk-SK" dirty="0" smtClean="0">
+                <a:hlinkClick r:id="rId3"/>
+              </a:rPr>
+              <a:t>https://www.kaggle.com/datasets</a:t>
+            </a:r>
+            <a:endParaRPr lang="sk-SK" dirty="0" smtClean="0"/>
+          </a:p>
+          <a:p>
+            <a:endParaRPr lang="sk-SK" dirty="0"/>
+          </a:p>
+          <a:p>
+            <a:pPr marL="0" indent="0">
+              <a:buNone/>
+            </a:pPr>
+            <a:r>
+              <a:rPr lang="sk-SK" dirty="0" err="1" smtClean="0"/>
+              <a:t>Metavyhľadávače</a:t>
+            </a:r>
+            <a:r>
+              <a:rPr lang="sk-SK" dirty="0" smtClean="0"/>
+              <a:t> (niektoré žiaľ platené)</a:t>
+            </a:r>
+          </a:p>
+          <a:p>
+            <a:r>
+              <a:rPr lang="sk-SK" dirty="0" smtClean="0"/>
+              <a:t>Google </a:t>
+            </a:r>
+            <a:r>
+              <a:rPr lang="sk-SK" dirty="0" err="1" smtClean="0"/>
+              <a:t>Dataset</a:t>
+            </a:r>
+            <a:r>
+              <a:rPr lang="sk-SK" dirty="0" smtClean="0"/>
+              <a:t> </a:t>
+            </a:r>
+            <a:r>
+              <a:rPr lang="sk-SK" dirty="0" err="1" smtClean="0"/>
+              <a:t>Search</a:t>
+            </a:r>
+            <a:r>
+              <a:rPr lang="sk-SK" dirty="0" smtClean="0"/>
+              <a:t> - </a:t>
+            </a:r>
+            <a:r>
+              <a:rPr lang="sk-SK" dirty="0" smtClean="0">
+                <a:hlinkClick r:id="rId4"/>
+              </a:rPr>
+              <a:t>https://toolbox.google.com/datasetsearch</a:t>
+            </a:r>
+            <a:endParaRPr lang="sk-SK" dirty="0" smtClean="0"/>
+          </a:p>
+          <a:p>
+            <a:r>
+              <a:rPr lang="sk-SK" dirty="0" err="1" smtClean="0"/>
+              <a:t>Quandl</a:t>
+            </a:r>
+            <a:r>
+              <a:rPr lang="sk-SK" dirty="0" smtClean="0"/>
+              <a:t> - </a:t>
+            </a:r>
+            <a:r>
+              <a:rPr lang="sk-SK" dirty="0" smtClean="0">
+                <a:hlinkClick r:id="rId5"/>
+              </a:rPr>
+              <a:t>https://www.quandl.com/</a:t>
+            </a:r>
+            <a:endParaRPr lang="sk-SK" dirty="0" smtClean="0"/>
+          </a:p>
+          <a:p>
+            <a:endParaRPr lang="sk-SK" dirty="0" smtClean="0"/>
+          </a:p>
+          <a:p>
+            <a:endParaRPr lang="sk-SK" dirty="0" smtClean="0"/>
+          </a:p>
           <a:p>
             <a:endParaRPr lang="en-US" dirty="0"/>
           </a:p>
@@ -3385,7 +3332,7 @@
     </p:spTree>
     <p:extLst>
       <p:ext uri="{BB962C8B-B14F-4D97-AF65-F5344CB8AC3E}">
-        <p14:creationId xmlns:p14="http://schemas.microsoft.com/office/powerpoint/2010/main" val="2387385476"/>
+        <p14:creationId xmlns:p14="http://schemas.microsoft.com/office/powerpoint/2010/main" val="3389624603"/>
       </p:ext>
     </p:extLst>
   </p:cSld>
@@ -3436,7 +3383,7 @@
           <a:p>
             <a:r>
               <a:rPr lang="sk-SK" dirty="0" smtClean="0"/>
-              <a:t>Zdroje údajov</a:t>
+              <a:t>Otvorené dáta	</a:t>
             </a:r>
             <a:endParaRPr lang="en-US" dirty="0"/>
           </a:p>
@@ -3444,27 +3391,87 @@
       </p:sp>
       <p:sp>
         <p:nvSpPr>
-          <p:cNvPr id="4" name="Text Placeholder 3"/>
-          <p:cNvSpPr>
-            <a:spLocks noGrp="1"/>
-          </p:cNvSpPr>
-          <p:nvPr>
-            <p:ph type="body" idx="1"/>
-          </p:nvPr>
-        </p:nvSpPr>
-        <p:spPr/>
-        <p:txBody>
-          <a:bodyPr/>
-          <a:lstStyle/>
-          <a:p>
-            <a:endParaRPr lang="en-US"/>
+          <p:cNvPr id="3" name="Content Placeholder 2"/>
+          <p:cNvSpPr>
+            <a:spLocks noGrp="1"/>
+          </p:cNvSpPr>
+          <p:nvPr>
+            <p:ph idx="1"/>
+          </p:nvPr>
+        </p:nvSpPr>
+        <p:spPr/>
+        <p:txBody>
+          <a:bodyPr/>
+          <a:lstStyle/>
+          <a:p>
+            <a:r>
+              <a:rPr lang="en-US" dirty="0" smtClean="0">
+                <a:hlinkClick r:id="rId2"/>
+              </a:rPr>
+              <a:t>http://opendata.sk</a:t>
+            </a:r>
+            <a:endParaRPr lang="sk-SK" dirty="0" smtClean="0"/>
+          </a:p>
+          <a:p>
+            <a:r>
+              <a:rPr lang="en-US" dirty="0" smtClean="0">
+                <a:hlinkClick r:id="rId3"/>
+              </a:rPr>
+              <a:t>https://data.gov.sk/</a:t>
+            </a:r>
+            <a:endParaRPr lang="sk-SK" dirty="0" smtClean="0"/>
+          </a:p>
+          <a:p>
+            <a:r>
+              <a:rPr lang="en-US" dirty="0" smtClean="0">
+                <a:hlinkClick r:id="rId4"/>
+              </a:rPr>
+              <a:t>https://ekosystem.slovensko.digital/</a:t>
+            </a:r>
+            <a:endParaRPr lang="sk-SK" dirty="0" smtClean="0"/>
+          </a:p>
+          <a:p>
+            <a:endParaRPr lang="sk-SK" dirty="0"/>
+          </a:p>
+          <a:p>
+            <a:r>
+              <a:rPr lang="en-US" dirty="0" smtClean="0">
+                <a:hlinkClick r:id="rId5"/>
+              </a:rPr>
+              <a:t>https://slovak.statistics.sk</a:t>
+            </a:r>
+            <a:endParaRPr lang="sk-SK" dirty="0" smtClean="0"/>
+          </a:p>
+          <a:p>
+            <a:r>
+              <a:rPr lang="en-US" dirty="0" smtClean="0">
+                <a:hlinkClick r:id="rId6"/>
+              </a:rPr>
+              <a:t>https://ec.europa.eu/eurostat</a:t>
+            </a:r>
+            <a:endParaRPr lang="sk-SK" dirty="0" smtClean="0"/>
+          </a:p>
+          <a:p>
+            <a:r>
+              <a:rPr lang="sk-SK" dirty="0" smtClean="0">
+                <a:hlinkClick r:id="rId7"/>
+              </a:rPr>
+              <a:t>http://databank.worldbank.org/data/home.aspx</a:t>
+            </a:r>
+            <a:endParaRPr lang="sk-SK" dirty="0" smtClean="0"/>
+          </a:p>
+          <a:p>
+            <a:endParaRPr lang="sk-SK" dirty="0" smtClean="0"/>
+          </a:p>
+          <a:p>
+            <a:endParaRPr lang="en-US" dirty="0"/>
           </a:p>
         </p:txBody>
       </p:sp>
     </p:spTree>
     <p:extLst>
       <p:ext uri="{BB962C8B-B14F-4D97-AF65-F5344CB8AC3E}">
-        <p14:creationId xmlns:p14="http://schemas.microsoft.com/office/powerpoint/2010/main" val="2121532146"/>
+        <p14:creationId xmlns:p14="http://schemas.microsoft.com/office/powerpoint/2010/main" val="3453765850"/>
       </p:ext>
     </p:extLst>
   </p:cSld>
@@ -3515,15 +3522,7 @@
           <a:p>
             <a:r>
               <a:rPr lang="sk-SK" dirty="0" smtClean="0"/>
-              <a:t>Pekne pripravené </a:t>
-            </a:r>
-            <a:r>
-              <a:rPr lang="sk-SK" dirty="0" err="1" smtClean="0"/>
-              <a:t>datasety</a:t>
-            </a:r>
-            <a:r>
-              <a:rPr lang="sk-SK" dirty="0" smtClean="0"/>
-              <a:t> na prácu</a:t>
+              <a:t>Rôzne vedecké inštitúcie zverejňujú svoje dáta</a:t>
             </a:r>
             <a:endParaRPr lang="en-US" dirty="0"/>
           </a:p>
@@ -3546,107 +3545,27 @@
           <a:p>
             <a:r>
               <a:rPr lang="sk-SK" dirty="0" smtClean="0"/>
-              <a:t>UCI - </a:t>
+              <a:t>CERN - </a:t>
             </a:r>
             <a:r>
               <a:rPr lang="sk-SK" dirty="0" smtClean="0">
                 <a:hlinkClick r:id="rId2"/>
               </a:rPr>
-              <a:t>http://archive.ics.uci.edu/ml/index.php</a:t>
+              <a:t>http://opendata.cern.ch/</a:t>
             </a:r>
             <a:endParaRPr lang="sk-SK" dirty="0" smtClean="0"/>
           </a:p>
           <a:p>
             <a:r>
-              <a:rPr lang="sk-SK" dirty="0" err="1" smtClean="0"/>
-              <a:t>Kaggle</a:t>
-            </a:r>
-            <a:r>
-              <a:rPr lang="sk-SK" dirty="0" smtClean="0"/>
-              <a:t> </a:t>
-            </a:r>
-            <a:r>
-              <a:rPr lang="sk-SK" dirty="0" err="1" smtClean="0"/>
-              <a:t>Datasets</a:t>
-            </a:r>
-            <a:r>
-              <a:rPr lang="sk-SK" dirty="0" smtClean="0"/>
-              <a:t> - </a:t>
+              <a:rPr lang="sk-SK" dirty="0" smtClean="0"/>
+              <a:t>NASA - </a:t>
             </a:r>
             <a:r>
               <a:rPr lang="sk-SK" dirty="0" smtClean="0">
                 <a:hlinkClick r:id="rId3"/>
               </a:rPr>
-              <a:t>https://www.kaggle.com/datasets</a:t>
-            </a:r>
-            <a:endParaRPr lang="sk-SK" dirty="0" smtClean="0"/>
-          </a:p>
-          <a:p>
-            <a:endParaRPr lang="sk-SK" dirty="0"/>
-          </a:p>
-          <a:p>
-            <a:pPr marL="0" indent="0">
-              <a:buNone/>
-            </a:pPr>
-            <a:r>
-              <a:rPr lang="sk-SK" dirty="0" err="1" smtClean="0"/>
-              <a:t>Metavyhľadávače</a:t>
-            </a:r>
-            <a:r>
-              <a:rPr lang="sk-SK" dirty="0" smtClean="0"/>
-              <a:t> (niektoré žiaľ platené)</a:t>
-            </a:r>
-          </a:p>
-          <a:p>
-            <a:r>
-              <a:rPr lang="sk-SK" dirty="0" smtClean="0"/>
-              <a:t>Google </a:t>
-            </a:r>
-            <a:r>
-              <a:rPr lang="sk-SK" dirty="0" err="1" smtClean="0"/>
-              <a:t>Dataset</a:t>
-            </a:r>
-            <a:r>
-              <a:rPr lang="sk-SK" dirty="0" smtClean="0"/>
-              <a:t> </a:t>
-            </a:r>
-            <a:r>
-              <a:rPr lang="sk-SK" dirty="0" err="1" smtClean="0"/>
-              <a:t>Search</a:t>
-            </a:r>
-            <a:r>
-              <a:rPr lang="sk-SK" dirty="0" smtClean="0"/>
-              <a:t> - </a:t>
-            </a:r>
-            <a:r>
-              <a:rPr lang="sk-SK" dirty="0" smtClean="0">
-                <a:hlinkClick r:id="rId4"/>
-              </a:rPr>
-              <a:t>https://toolbox.google.com/datasetsearch</a:t>
-            </a:r>
-            <a:endParaRPr lang="sk-SK" dirty="0" smtClean="0"/>
-          </a:p>
-          <a:p>
-            <a:r>
-              <a:rPr lang="sk-SK" dirty="0" err="1" smtClean="0"/>
-              <a:t>Quandl</a:t>
-            </a:r>
-            <a:r>
-              <a:rPr lang="sk-SK" dirty="0" smtClean="0"/>
-              <a:t> - </a:t>
-            </a:r>
-            <a:r>
-              <a:rPr lang="sk-SK" dirty="0" smtClean="0">
-                <a:hlinkClick r:id="rId5"/>
-              </a:rPr>
-              <a:t>https://www.quandl.com/</a:t>
-            </a:r>
-            <a:endParaRPr lang="sk-SK" dirty="0" smtClean="0"/>
-          </a:p>
-          <a:p>
-            <a:endParaRPr lang="sk-SK" dirty="0" smtClean="0"/>
-          </a:p>
-          <a:p>
+              <a:t>https://data.nasa.gov/</a:t>
+            </a:r>
             <a:endParaRPr lang="sk-SK" dirty="0" smtClean="0"/>
           </a:p>
           <a:p>
@@ -3657,7 +3576,7 @@
     </p:spTree>
     <p:extLst>
       <p:ext uri="{BB962C8B-B14F-4D97-AF65-F5344CB8AC3E}">
-        <p14:creationId xmlns:p14="http://schemas.microsoft.com/office/powerpoint/2010/main" val="3389624603"/>
+        <p14:creationId xmlns:p14="http://schemas.microsoft.com/office/powerpoint/2010/main" val="1950157271"/>
       </p:ext>
     </p:extLst>
   </p:cSld>
@@ -3708,7 +3627,7 @@
           <a:p>
             <a:r>
               <a:rPr lang="sk-SK" dirty="0" smtClean="0"/>
-              <a:t>Otvorené dáta	</a:t>
+              <a:t>API</a:t>
             </a:r>
             <a:endParaRPr lang="en-US" dirty="0"/>
           </a:p>
@@ -3724,71 +3643,95 @@
             <p:ph idx="1"/>
           </p:nvPr>
         </p:nvSpPr>
-        <p:spPr/>
-        <p:txBody>
-          <a:bodyPr/>
-          <a:lstStyle/>
-          <a:p>
-            <a:r>
-              <a:rPr lang="en-US" dirty="0" smtClean="0">
-                <a:hlinkClick r:id="rId2"/>
-              </a:rPr>
-              <a:t>http://opendata.sk</a:t>
-            </a:r>
-            <a:endParaRPr lang="sk-SK" dirty="0" smtClean="0"/>
-          </a:p>
-          <a:p>
-            <a:r>
-              <a:rPr lang="en-US" dirty="0" smtClean="0">
-                <a:hlinkClick r:id="rId3"/>
-              </a:rPr>
-              <a:t>https://data.gov.sk/</a:t>
-            </a:r>
-            <a:endParaRPr lang="sk-SK" dirty="0" smtClean="0"/>
-          </a:p>
-          <a:p>
-            <a:r>
-              <a:rPr lang="en-US" dirty="0" smtClean="0">
-                <a:hlinkClick r:id="rId4"/>
-              </a:rPr>
-              <a:t>https://ekosystem.slovensko.digital/</a:t>
-            </a:r>
-            <a:endParaRPr lang="sk-SK" dirty="0" smtClean="0"/>
+        <p:spPr>
+          <a:xfrm>
+            <a:off x="838200" y="1825625"/>
+            <a:ext cx="10939670" cy="4351338"/>
+          </a:xfrm>
+        </p:spPr>
+        <p:txBody>
+          <a:bodyPr>
+            <a:normAutofit fontScale="92500" lnSpcReduction="10000"/>
+          </a:bodyPr>
+          <a:lstStyle/>
+          <a:p>
+            <a:pPr marL="0" indent="0">
+              <a:buNone/>
+            </a:pPr>
+            <a:r>
+              <a:rPr lang="sk-SK" dirty="0" smtClean="0"/>
+              <a:t>Vývojári aplikácií chcú uľahčiť prístup k údajom alebo aby ľudia stavali aplikácie okolo tej ich.</a:t>
+            </a:r>
+          </a:p>
+          <a:p>
+            <a:pPr marL="0" indent="0">
+              <a:buNone/>
+            </a:pPr>
+            <a:r>
+              <a:rPr lang="sk-SK" dirty="0" smtClean="0"/>
+              <a:t>Obyčajne obmedzenia ak ide o osobné údaje.</a:t>
+            </a:r>
+          </a:p>
+          <a:p>
+            <a:pPr marL="0" indent="0">
+              <a:buNone/>
+            </a:pPr>
+            <a:r>
+              <a:rPr lang="sk-SK" dirty="0" smtClean="0"/>
+              <a:t>Otvorené (obmedzenia) aj platené.</a:t>
+            </a:r>
+          </a:p>
+          <a:p>
+            <a:r>
+              <a:rPr lang="sk-SK" dirty="0" smtClean="0"/>
+              <a:t>Facebook</a:t>
+            </a:r>
+          </a:p>
+          <a:p>
+            <a:r>
+              <a:rPr lang="sk-SK" dirty="0" smtClean="0"/>
+              <a:t>Twitter</a:t>
+            </a:r>
+          </a:p>
+          <a:p>
+            <a:r>
+              <a:rPr lang="sk-SK" dirty="0" smtClean="0"/>
+              <a:t>Google</a:t>
+            </a:r>
+          </a:p>
+          <a:p>
+            <a:r>
+              <a:rPr lang="sk-SK" dirty="0" smtClean="0"/>
+              <a:t>...</a:t>
+            </a:r>
           </a:p>
           <a:p>
             <a:endParaRPr lang="sk-SK" dirty="0"/>
           </a:p>
           <a:p>
-            <a:r>
-              <a:rPr lang="en-US" dirty="0" smtClean="0">
-                <a:hlinkClick r:id="rId5"/>
-              </a:rPr>
-              <a:t>https://slovak.statistics.sk</a:t>
-            </a:r>
-            <a:endParaRPr lang="sk-SK" dirty="0" smtClean="0"/>
-          </a:p>
-          <a:p>
-            <a:r>
-              <a:rPr lang="en-US" dirty="0" smtClean="0">
-                <a:hlinkClick r:id="rId6"/>
-              </a:rPr>
-              <a:t>https://ec.europa.eu/eurostat</a:t>
-            </a:r>
-            <a:endParaRPr lang="sk-SK" dirty="0" smtClean="0"/>
-          </a:p>
-          <a:p>
-            <a:r>
-              <a:rPr lang="sk-SK" dirty="0" smtClean="0">
-                <a:hlinkClick r:id="rId7"/>
-              </a:rPr>
-              <a:t>http://databank.worldbank.org/data/home.aspx</a:t>
-            </a:r>
-            <a:endParaRPr lang="sk-SK" dirty="0" smtClean="0"/>
-          </a:p>
-          <a:p>
-            <a:endParaRPr lang="sk-SK" dirty="0" smtClean="0"/>
-          </a:p>
-          <a:p>
+            <a:pPr marL="0" indent="0">
+              <a:buNone/>
+            </a:pPr>
+            <a:r>
+              <a:rPr lang="en-US" dirty="0" smtClean="0"/>
+              <a:t>Programmable</a:t>
+            </a:r>
+            <a:r>
+              <a:rPr lang="sk-SK" dirty="0" smtClean="0"/>
+              <a:t>W</a:t>
+            </a:r>
+            <a:r>
+              <a:rPr lang="en-US" dirty="0" err="1" smtClean="0"/>
+              <a:t>eb</a:t>
+            </a:r>
+            <a:r>
+              <a:rPr lang="sk-SK" dirty="0" smtClean="0"/>
+              <a:t> - </a:t>
+            </a:r>
+            <a:r>
+              <a:rPr lang="en-US" dirty="0" smtClean="0"/>
+              <a:t>https://www.programmableweb.com/apis/directory</a:t>
+            </a:r>
             <a:endParaRPr lang="en-US" dirty="0"/>
           </a:p>
         </p:txBody>
@@ -3796,7 +3739,7 @@
     </p:spTree>
     <p:extLst>
       <p:ext uri="{BB962C8B-B14F-4D97-AF65-F5344CB8AC3E}">
-        <p14:creationId xmlns:p14="http://schemas.microsoft.com/office/powerpoint/2010/main" val="3453765850"/>
+        <p14:creationId xmlns:p14="http://schemas.microsoft.com/office/powerpoint/2010/main" val="2514277528"/>
       </p:ext>
     </p:extLst>
   </p:cSld>
@@ -3847,7 +3790,7 @@
           <a:p>
             <a:r>
               <a:rPr lang="sk-SK" dirty="0" smtClean="0"/>
-              <a:t>Rôzne vedecké inštitúcie zverejňujú svoje dáta</a:t>
+              <a:t>Logy / vlastné meranie (senzory)</a:t>
             </a:r>
             <a:endParaRPr lang="en-US" dirty="0"/>
           </a:p>
@@ -3869,29 +3812,23 @@
           <a:lstStyle/>
           <a:p>
             <a:r>
-              <a:rPr lang="sk-SK" dirty="0" smtClean="0"/>
-              <a:t>CERN - </a:t>
-            </a:r>
-            <a:r>
-              <a:rPr lang="sk-SK" dirty="0" smtClean="0">
-                <a:hlinkClick r:id="rId2"/>
-              </a:rPr>
-              <a:t>http://opendata.cern.ch/</a:t>
-            </a:r>
-            <a:endParaRPr lang="sk-SK" dirty="0" smtClean="0"/>
-          </a:p>
-          <a:p>
-            <a:r>
-              <a:rPr lang="sk-SK" dirty="0" smtClean="0"/>
-              <a:t>NASA - </a:t>
-            </a:r>
-            <a:r>
-              <a:rPr lang="sk-SK" dirty="0" smtClean="0">
-                <a:hlinkClick r:id="rId3"/>
-              </a:rPr>
-              <a:t>https://data.nasa.gov/</a:t>
-            </a:r>
-            <a:endParaRPr lang="sk-SK" dirty="0" smtClean="0"/>
+              <a:rPr lang="sk-SK" dirty="0" err="1" smtClean="0"/>
+              <a:t>Weblogy</a:t>
+            </a:r>
+            <a:r>
+              <a:rPr lang="sk-SK" dirty="0" smtClean="0"/>
+              <a:t> aktivity ľudí (na fakulte sme mali už celkom veľa projektov)</a:t>
+            </a:r>
+          </a:p>
+          <a:p>
+            <a:r>
+              <a:rPr lang="sk-SK" dirty="0" err="1" smtClean="0"/>
+              <a:t>Eyetracking</a:t>
+            </a:r>
+            <a:r>
+              <a:rPr lang="sk-SK" dirty="0" smtClean="0"/>
+              <a:t>, EEG, teplota, vlhkosť, pohyb, ...</a:t>
+            </a:r>
           </a:p>
           <a:p>
             <a:endParaRPr lang="en-US" dirty="0"/>
@@ -3901,7 +3838,7 @@
     </p:spTree>
     <p:extLst>
       <p:ext uri="{BB962C8B-B14F-4D97-AF65-F5344CB8AC3E}">
-        <p14:creationId xmlns:p14="http://schemas.microsoft.com/office/powerpoint/2010/main" val="1950157271"/>
+        <p14:creationId xmlns:p14="http://schemas.microsoft.com/office/powerpoint/2010/main" val="2225801496"/>
       </p:ext>
     </p:extLst>
   </p:cSld>
@@ -3950,11 +3887,7 @@
           <a:bodyPr/>
           <a:lstStyle/>
           <a:p>
-            <a:r>
-              <a:rPr lang="sk-SK" dirty="0" smtClean="0"/>
-              <a:t>API</a:t>
-            </a:r>
-            <a:endParaRPr lang="en-US" dirty="0"/>
+            <a:endParaRPr lang="en-US"/>
           </a:p>
         </p:txBody>
       </p:sp>
@@ -3968,94 +3901,26 @@
             <p:ph idx="1"/>
           </p:nvPr>
         </p:nvSpPr>
-        <p:spPr>
-          <a:xfrm>
-            <a:off x="838200" y="1825625"/>
-            <a:ext cx="10939670" cy="4351338"/>
-          </a:xfrm>
-        </p:spPr>
-        <p:txBody>
-          <a:bodyPr>
-            <a:normAutofit fontScale="92500" lnSpcReduction="10000"/>
-          </a:bodyPr>
-          <a:lstStyle/>
-          <a:p>
-            <a:pPr marL="0" indent="0">
-              <a:buNone/>
-            </a:pPr>
-            <a:r>
-              <a:rPr lang="sk-SK" dirty="0" smtClean="0"/>
-              <a:t>Vývojári aplikácií chcú uľahčiť prístup k údajom alebo aby ľudia stavali aplikácie okolo tej ich.</a:t>
-            </a:r>
-          </a:p>
-          <a:p>
-            <a:pPr marL="0" indent="0">
-              <a:buNone/>
-            </a:pPr>
-            <a:r>
-              <a:rPr lang="sk-SK" dirty="0" smtClean="0"/>
-              <a:t>Obyčajne obmedzenia ak ide o osobné údaje.</a:t>
-            </a:r>
-          </a:p>
-          <a:p>
-            <a:pPr marL="0" indent="0">
-              <a:buNone/>
-            </a:pPr>
-            <a:r>
-              <a:rPr lang="sk-SK" dirty="0" smtClean="0"/>
-              <a:t>Otvorené (obmedzenia) aj platené.</a:t>
-            </a:r>
-          </a:p>
-          <a:p>
-            <a:r>
-              <a:rPr lang="sk-SK" dirty="0" smtClean="0"/>
-              <a:t>Facebook</a:t>
-            </a:r>
-          </a:p>
-          <a:p>
-            <a:r>
-              <a:rPr lang="sk-SK" dirty="0" smtClean="0"/>
-              <a:t>Twitter</a:t>
-            </a:r>
-          </a:p>
-          <a:p>
-            <a:r>
-              <a:rPr lang="sk-SK" dirty="0" smtClean="0"/>
-              <a:t>Google</a:t>
-            </a:r>
-          </a:p>
-          <a:p>
-            <a:r>
-              <a:rPr lang="sk-SK" dirty="0" smtClean="0"/>
-              <a:t>...</a:t>
-            </a:r>
-          </a:p>
-          <a:p>
-            <a:endParaRPr lang="sk-SK" dirty="0"/>
-          </a:p>
-          <a:p>
-            <a:pPr marL="0" indent="0">
-              <a:buNone/>
-            </a:pPr>
-            <a:r>
-              <a:rPr lang="en-US" dirty="0" smtClean="0"/>
-              <a:t>Programmable</a:t>
-            </a:r>
-            <a:r>
-              <a:rPr lang="sk-SK" dirty="0" smtClean="0"/>
-              <a:t>W</a:t>
-            </a:r>
-            <a:r>
-              <a:rPr lang="en-US" dirty="0" err="1" smtClean="0"/>
-              <a:t>eb</a:t>
-            </a:r>
-            <a:r>
-              <a:rPr lang="sk-SK" dirty="0" smtClean="0"/>
-              <a:t> - </a:t>
-            </a:r>
-            <a:r>
-              <a:rPr lang="en-US" dirty="0" smtClean="0"/>
-              <a:t>https://www.programmableweb.com/apis/directory</a:t>
+        <p:spPr/>
+        <p:txBody>
+          <a:bodyPr/>
+          <a:lstStyle/>
+          <a:p>
+            <a:r>
+              <a:rPr lang="sk-SK" dirty="0" smtClean="0"/>
+              <a:t>Rôzne formáty </a:t>
+            </a:r>
+          </a:p>
+          <a:p>
+            <a:r>
+              <a:rPr lang="sk-SK" dirty="0" smtClean="0"/>
+              <a:t>Rôzne formy</a:t>
+            </a:r>
+          </a:p>
+          <a:p>
+            <a:r>
+              <a:rPr lang="sk-SK" dirty="0" smtClean="0"/>
+              <a:t>Rôzna kvalita </a:t>
             </a:r>
             <a:endParaRPr lang="en-US" dirty="0"/>
           </a:p>
@@ -4064,7 +3929,7 @@
     </p:spTree>
     <p:extLst>
       <p:ext uri="{BB962C8B-B14F-4D97-AF65-F5344CB8AC3E}">
-        <p14:creationId xmlns:p14="http://schemas.microsoft.com/office/powerpoint/2010/main" val="2514277528"/>
+        <p14:creationId xmlns:p14="http://schemas.microsoft.com/office/powerpoint/2010/main" val="282058665"/>
       </p:ext>
     </p:extLst>
   </p:cSld>
@@ -4100,7 +3965,7 @@
       </p:grpSpPr>
       <p:sp>
         <p:nvSpPr>
-          <p:cNvPr id="2" name="Title 1"/>
+          <p:cNvPr id="4" name="Title 3"/>
           <p:cNvSpPr>
             <a:spLocks noGrp="1"/>
           </p:cNvSpPr>
@@ -4115,7 +3980,7 @@
           <a:p>
             <a:r>
               <a:rPr lang="sk-SK" dirty="0" smtClean="0"/>
-              <a:t>Logy / vlastné meranie (senzory)</a:t>
+              <a:t>Úprava dát</a:t>
             </a:r>
             <a:endParaRPr lang="en-US" dirty="0"/>
           </a:p>
@@ -4123,47 +3988,27 @@
       </p:sp>
       <p:sp>
         <p:nvSpPr>
-          <p:cNvPr id="3" name="Content Placeholder 2"/>
-          <p:cNvSpPr>
-            <a:spLocks noGrp="1"/>
-          </p:cNvSpPr>
-          <p:nvPr>
-            <p:ph idx="1"/>
-          </p:nvPr>
-        </p:nvSpPr>
-        <p:spPr/>
-        <p:txBody>
-          <a:bodyPr/>
-          <a:lstStyle/>
-          <a:p>
-            <a:r>
-              <a:rPr lang="sk-SK" dirty="0" err="1" smtClean="0"/>
-              <a:t>Weblogy</a:t>
-            </a:r>
-            <a:r>
-              <a:rPr lang="sk-SK" dirty="0" smtClean="0"/>
-              <a:t> aktivity ľudí (na fakulte sme mali už celkom veľa projektov)</a:t>
-            </a:r>
-          </a:p>
-          <a:p>
-            <a:r>
-              <a:rPr lang="sk-SK" dirty="0" err="1" smtClean="0"/>
-              <a:t>Eyetracking</a:t>
-            </a:r>
-            <a:r>
-              <a:rPr lang="sk-SK" dirty="0" smtClean="0"/>
-              <a:t>, EEG, teplota, vlhkosť, pohyb, ...</a:t>
-            </a:r>
-          </a:p>
-          <a:p>
-            <a:endParaRPr lang="en-US" dirty="0"/>
+          <p:cNvPr id="5" name="Text Placeholder 4"/>
+          <p:cNvSpPr>
+            <a:spLocks noGrp="1"/>
+          </p:cNvSpPr>
+          <p:nvPr>
+            <p:ph type="body" idx="1"/>
+          </p:nvPr>
+        </p:nvSpPr>
+        <p:spPr/>
+        <p:txBody>
+          <a:bodyPr/>
+          <a:lstStyle/>
+          <a:p>
+            <a:endParaRPr lang="en-US"/>
           </a:p>
         </p:txBody>
       </p:sp>
     </p:spTree>
     <p:extLst>
       <p:ext uri="{BB962C8B-B14F-4D97-AF65-F5344CB8AC3E}">
-        <p14:creationId xmlns:p14="http://schemas.microsoft.com/office/powerpoint/2010/main" val="2225801496"/>
+        <p14:creationId xmlns:p14="http://schemas.microsoft.com/office/powerpoint/2010/main" val="175252571"/>
       </p:ext>
     </p:extLst>
   </p:cSld>
@@ -4212,289 +4057,6 @@
           <a:bodyPr/>
           <a:lstStyle/>
           <a:p>
-            <a:endParaRPr lang="en-US"/>
-          </a:p>
-        </p:txBody>
-      </p:sp>
-      <p:sp>
-        <p:nvSpPr>
-          <p:cNvPr id="3" name="Content Placeholder 2"/>
-          <p:cNvSpPr>
-            <a:spLocks noGrp="1"/>
-          </p:cNvSpPr>
-          <p:nvPr>
-            <p:ph idx="1"/>
-          </p:nvPr>
-        </p:nvSpPr>
-        <p:spPr/>
-        <p:txBody>
-          <a:bodyPr/>
-          <a:lstStyle/>
-          <a:p>
-            <a:r>
-              <a:rPr lang="sk-SK" dirty="0" smtClean="0"/>
-              <a:t>Rôzne formáty </a:t>
-            </a:r>
-          </a:p>
-          <a:p>
-            <a:r>
-              <a:rPr lang="sk-SK" dirty="0" smtClean="0"/>
-              <a:t>Rôzne formy</a:t>
-            </a:r>
-          </a:p>
-          <a:p>
-            <a:r>
-              <a:rPr lang="sk-SK" dirty="0" smtClean="0"/>
-              <a:t>Rôzna kvalita </a:t>
-            </a:r>
-            <a:endParaRPr lang="en-US" dirty="0"/>
-          </a:p>
-        </p:txBody>
-      </p:sp>
-    </p:spTree>
-    <p:extLst>
-      <p:ext uri="{BB962C8B-B14F-4D97-AF65-F5344CB8AC3E}">
-        <p14:creationId xmlns:p14="http://schemas.microsoft.com/office/powerpoint/2010/main" val="282058665"/>
-      </p:ext>
-    </p:extLst>
-  </p:cSld>
-  <p:clrMapOvr>
-    <a:masterClrMapping/>
-  </p:clrMapOvr>
-  <p:timing>
-    <p:tnLst>
-      <p:par>
-        <p:cTn id="1" dur="indefinite" restart="never" nodeType="tmRoot"/>
-      </p:par>
-    </p:tnLst>
-  </p:timing>
-</p:sld>
-</file>
-
-<file path=ppt/slides/slide19.xml><?xml version="1.0" encoding="utf-8"?>
-<p:sld xmlns:a="http://schemas.openxmlformats.org/drawingml/2006/main" xmlns:r="http://schemas.openxmlformats.org/officeDocument/2006/relationships" xmlns:p="http://schemas.openxmlformats.org/presentationml/2006/main">
-  <p:cSld>
-    <p:spTree>
-      <p:nvGrpSpPr>
-        <p:cNvPr id="1" name=""/>
-        <p:cNvGrpSpPr/>
-        <p:nvPr/>
-      </p:nvGrpSpPr>
-      <p:grpSpPr>
-        <a:xfrm>
-          <a:off x="0" y="0"/>
-          <a:ext cx="0" cy="0"/>
-          <a:chOff x="0" y="0"/>
-          <a:chExt cx="0" cy="0"/>
-        </a:xfrm>
-      </p:grpSpPr>
-      <p:sp>
-        <p:nvSpPr>
-          <p:cNvPr id="4" name="Title 3"/>
-          <p:cNvSpPr>
-            <a:spLocks noGrp="1"/>
-          </p:cNvSpPr>
-          <p:nvPr>
-            <p:ph type="title"/>
-          </p:nvPr>
-        </p:nvSpPr>
-        <p:spPr/>
-        <p:txBody>
-          <a:bodyPr/>
-          <a:lstStyle/>
-          <a:p>
-            <a:r>
-              <a:rPr lang="sk-SK" dirty="0" smtClean="0"/>
-              <a:t>Úprava dát</a:t>
-            </a:r>
-            <a:endParaRPr lang="en-US" dirty="0"/>
-          </a:p>
-        </p:txBody>
-      </p:sp>
-      <p:sp>
-        <p:nvSpPr>
-          <p:cNvPr id="5" name="Text Placeholder 4"/>
-          <p:cNvSpPr>
-            <a:spLocks noGrp="1"/>
-          </p:cNvSpPr>
-          <p:nvPr>
-            <p:ph type="body" idx="1"/>
-          </p:nvPr>
-        </p:nvSpPr>
-        <p:spPr/>
-        <p:txBody>
-          <a:bodyPr/>
-          <a:lstStyle/>
-          <a:p>
-            <a:endParaRPr lang="en-US"/>
-          </a:p>
-        </p:txBody>
-      </p:sp>
-    </p:spTree>
-    <p:extLst>
-      <p:ext uri="{BB962C8B-B14F-4D97-AF65-F5344CB8AC3E}">
-        <p14:creationId xmlns:p14="http://schemas.microsoft.com/office/powerpoint/2010/main" val="175252571"/>
-      </p:ext>
-    </p:extLst>
-  </p:cSld>
-  <p:clrMapOvr>
-    <a:masterClrMapping/>
-  </p:clrMapOvr>
-  <p:timing>
-    <p:tnLst>
-      <p:par>
-        <p:cTn id="1" dur="indefinite" restart="never" nodeType="tmRoot"/>
-      </p:par>
-    </p:tnLst>
-  </p:timing>
-</p:sld>
-</file>
-
-<file path=ppt/slides/slide2.xml><?xml version="1.0" encoding="utf-8"?>
-<p:sld xmlns:a="http://schemas.openxmlformats.org/drawingml/2006/main" xmlns:r="http://schemas.openxmlformats.org/officeDocument/2006/relationships" xmlns:p="http://schemas.openxmlformats.org/presentationml/2006/main">
-  <p:cSld>
-    <p:spTree>
-      <p:nvGrpSpPr>
-        <p:cNvPr id="1" name=""/>
-        <p:cNvGrpSpPr/>
-        <p:nvPr/>
-      </p:nvGrpSpPr>
-      <p:grpSpPr>
-        <a:xfrm>
-          <a:off x="0" y="0"/>
-          <a:ext cx="0" cy="0"/>
-          <a:chOff x="0" y="0"/>
-          <a:chExt cx="0" cy="0"/>
-        </a:xfrm>
-      </p:grpSpPr>
-      <p:sp>
-        <p:nvSpPr>
-          <p:cNvPr id="2" name="Title 1"/>
-          <p:cNvSpPr>
-            <a:spLocks noGrp="1"/>
-          </p:cNvSpPr>
-          <p:nvPr>
-            <p:ph type="title"/>
-          </p:nvPr>
-        </p:nvSpPr>
-        <p:spPr/>
-        <p:txBody>
-          <a:bodyPr/>
-          <a:lstStyle/>
-          <a:p>
-            <a:r>
-              <a:rPr lang="sk-SK" dirty="0" smtClean="0"/>
-              <a:t>Agenda</a:t>
-            </a:r>
-            <a:endParaRPr lang="en-US" dirty="0"/>
-          </a:p>
-        </p:txBody>
-      </p:sp>
-      <p:sp>
-        <p:nvSpPr>
-          <p:cNvPr id="3" name="Content Placeholder 2"/>
-          <p:cNvSpPr>
-            <a:spLocks noGrp="1"/>
-          </p:cNvSpPr>
-          <p:nvPr>
-            <p:ph idx="1"/>
-          </p:nvPr>
-        </p:nvSpPr>
-        <p:spPr/>
-        <p:txBody>
-          <a:bodyPr/>
-          <a:lstStyle/>
-          <a:p>
-            <a:r>
-              <a:rPr lang="sk-SK" dirty="0"/>
-              <a:t>Spätná väzba z </a:t>
-            </a:r>
-            <a:r>
-              <a:rPr lang="sk-SK" dirty="0" smtClean="0"/>
-              <a:t>minulého týždňa</a:t>
-            </a:r>
-            <a:endParaRPr lang="sk-SK" dirty="0"/>
-          </a:p>
-          <a:p>
-            <a:r>
-              <a:rPr lang="sk-SK" dirty="0" smtClean="0"/>
-              <a:t>Rýchla rekapitulácia + Príklad otázok na témy z predchádzajúceho týždňa</a:t>
-            </a:r>
-            <a:endParaRPr lang="en-US" dirty="0" smtClean="0"/>
-          </a:p>
-          <a:p>
-            <a:r>
-              <a:rPr lang="sk-SK" dirty="0" smtClean="0"/>
-              <a:t>Kde a ako získať dáta</a:t>
-            </a:r>
-          </a:p>
-          <a:p>
-            <a:r>
-              <a:rPr lang="sk-SK" dirty="0" smtClean="0"/>
-              <a:t>Ako ich upraviť do formátu, ktorý potrebujeme</a:t>
-            </a:r>
-          </a:p>
-          <a:p>
-            <a:r>
-              <a:rPr lang="sk-SK" dirty="0" smtClean="0"/>
-              <a:t>Prepájanie rôznych zdrojov dát</a:t>
-            </a:r>
-            <a:endParaRPr lang="en-US" dirty="0"/>
-          </a:p>
-        </p:txBody>
-      </p:sp>
-    </p:spTree>
-    <p:extLst>
-      <p:ext uri="{BB962C8B-B14F-4D97-AF65-F5344CB8AC3E}">
-        <p14:creationId xmlns:p14="http://schemas.microsoft.com/office/powerpoint/2010/main" val="535015259"/>
-      </p:ext>
-    </p:extLst>
-  </p:cSld>
-  <p:clrMapOvr>
-    <a:masterClrMapping/>
-  </p:clrMapOvr>
-  <p:timing>
-    <p:tnLst>
-      <p:par>
-        <p:cTn id="1" dur="indefinite" restart="never" nodeType="tmRoot"/>
-      </p:par>
-    </p:tnLst>
-  </p:timing>
-</p:sld>
-</file>
-
-<file path=ppt/slides/slide20.xml><?xml version="1.0" encoding="utf-8"?>
-<p:sld xmlns:a="http://schemas.openxmlformats.org/drawingml/2006/main" xmlns:r="http://schemas.openxmlformats.org/officeDocument/2006/relationships" xmlns:p="http://schemas.openxmlformats.org/presentationml/2006/main">
-  <p:cSld>
-    <p:spTree>
-      <p:nvGrpSpPr>
-        <p:cNvPr id="1" name=""/>
-        <p:cNvGrpSpPr/>
-        <p:nvPr/>
-      </p:nvGrpSpPr>
-      <p:grpSpPr>
-        <a:xfrm>
-          <a:off x="0" y="0"/>
-          <a:ext cx="0" cy="0"/>
-          <a:chOff x="0" y="0"/>
-          <a:chExt cx="0" cy="0"/>
-        </a:xfrm>
-      </p:grpSpPr>
-      <p:sp>
-        <p:nvSpPr>
-          <p:cNvPr id="2" name="Title 1"/>
-          <p:cNvSpPr>
-            <a:spLocks noGrp="1"/>
-          </p:cNvSpPr>
-          <p:nvPr>
-            <p:ph type="title"/>
-          </p:nvPr>
-        </p:nvSpPr>
-        <p:spPr/>
-        <p:txBody>
-          <a:bodyPr/>
-          <a:lstStyle/>
-          <a:p>
             <a:endParaRPr lang="en-US" dirty="0"/>
           </a:p>
         </p:txBody>
@@ -4561,7 +4123,7 @@
 </p:sld>
 </file>
 
-<file path=ppt/slides/slide21.xml><?xml version="1.0" encoding="utf-8"?>
+<file path=ppt/slides/slide19.xml><?xml version="1.0" encoding="utf-8"?>
 <p:sld xmlns:a="http://schemas.openxmlformats.org/drawingml/2006/main" xmlns:r="http://schemas.openxmlformats.org/officeDocument/2006/relationships" xmlns:p="http://schemas.openxmlformats.org/presentationml/2006/main">
   <p:cSld>
     <p:spTree>
@@ -4689,7 +4251,120 @@
 </p:sld>
 </file>
 
-<file path=ppt/slides/slide22.xml><?xml version="1.0" encoding="utf-8"?>
+<file path=ppt/slides/slide2.xml><?xml version="1.0" encoding="utf-8"?>
+<p:sld xmlns:a="http://schemas.openxmlformats.org/drawingml/2006/main" xmlns:r="http://schemas.openxmlformats.org/officeDocument/2006/relationships" xmlns:p="http://schemas.openxmlformats.org/presentationml/2006/main">
+  <p:cSld>
+    <p:spTree>
+      <p:nvGrpSpPr>
+        <p:cNvPr id="1" name=""/>
+        <p:cNvGrpSpPr/>
+        <p:nvPr/>
+      </p:nvGrpSpPr>
+      <p:grpSpPr>
+        <a:xfrm>
+          <a:off x="0" y="0"/>
+          <a:ext cx="0" cy="0"/>
+          <a:chOff x="0" y="0"/>
+          <a:chExt cx="0" cy="0"/>
+        </a:xfrm>
+      </p:grpSpPr>
+      <p:sp>
+        <p:nvSpPr>
+          <p:cNvPr id="2" name="Title 1"/>
+          <p:cNvSpPr>
+            <a:spLocks noGrp="1"/>
+          </p:cNvSpPr>
+          <p:nvPr>
+            <p:ph type="title"/>
+          </p:nvPr>
+        </p:nvSpPr>
+        <p:spPr/>
+        <p:txBody>
+          <a:bodyPr/>
+          <a:lstStyle/>
+          <a:p>
+            <a:r>
+              <a:rPr lang="sk-SK" dirty="0" smtClean="0"/>
+              <a:t>Agenda</a:t>
+            </a:r>
+            <a:endParaRPr lang="en-US" dirty="0"/>
+          </a:p>
+        </p:txBody>
+      </p:sp>
+      <p:sp>
+        <p:nvSpPr>
+          <p:cNvPr id="3" name="Content Placeholder 2"/>
+          <p:cNvSpPr>
+            <a:spLocks noGrp="1"/>
+          </p:cNvSpPr>
+          <p:nvPr>
+            <p:ph idx="1"/>
+          </p:nvPr>
+        </p:nvSpPr>
+        <p:spPr/>
+        <p:txBody>
+          <a:bodyPr/>
+          <a:lstStyle/>
+          <a:p>
+            <a:r>
+              <a:rPr lang="sk-SK" dirty="0"/>
+              <a:t>Spätná väzba z </a:t>
+            </a:r>
+            <a:r>
+              <a:rPr lang="sk-SK" dirty="0" smtClean="0"/>
+              <a:t>minulého týždňa</a:t>
+            </a:r>
+            <a:endParaRPr lang="sk-SK" dirty="0"/>
+          </a:p>
+          <a:p>
+            <a:r>
+              <a:rPr lang="sk-SK" dirty="0" smtClean="0"/>
+              <a:t>Rýchla rekapitulácia + Príklad otázok na témy z predchádzajúceho týždňa</a:t>
+            </a:r>
+            <a:endParaRPr lang="en-US" dirty="0" smtClean="0"/>
+          </a:p>
+          <a:p>
+            <a:r>
+              <a:rPr lang="sk-SK" dirty="0" smtClean="0"/>
+              <a:t>Kde a ako získať dáta</a:t>
+            </a:r>
+          </a:p>
+          <a:p>
+            <a:r>
+              <a:rPr lang="sk-SK" dirty="0" smtClean="0"/>
+              <a:t>Ako ich upraviť do formátu, ktorý potrebujeme</a:t>
+            </a:r>
+          </a:p>
+          <a:p>
+            <a:r>
+              <a:rPr lang="sk-SK" dirty="0" smtClean="0"/>
+              <a:t>Prepájanie rôznych zdrojov dát</a:t>
+            </a:r>
+            <a:endParaRPr lang="en-US" dirty="0"/>
+          </a:p>
+        </p:txBody>
+      </p:sp>
+    </p:spTree>
+    <p:extLst>
+      <p:ext uri="{BB962C8B-B14F-4D97-AF65-F5344CB8AC3E}">
+        <p14:creationId xmlns:p14="http://schemas.microsoft.com/office/powerpoint/2010/main" val="535015259"/>
+      </p:ext>
+    </p:extLst>
+  </p:cSld>
+  <p:clrMapOvr>
+    <a:masterClrMapping/>
+  </p:clrMapOvr>
+  <p:timing>
+    <p:tnLst>
+      <p:par>
+        <p:cTn id="1" dur="indefinite" restart="never" nodeType="tmRoot"/>
+      </p:par>
+    </p:tnLst>
+  </p:timing>
+</p:sld>
+</file>
+
+<file path=ppt/slides/slide20.xml><?xml version="1.0" encoding="utf-8"?>
 <p:sld xmlns:a="http://schemas.openxmlformats.org/drawingml/2006/main" xmlns:r="http://schemas.openxmlformats.org/officeDocument/2006/relationships" xmlns:p="http://schemas.openxmlformats.org/presentationml/2006/main">
   <p:cSld>
     <p:spTree>
@@ -4772,7 +4447,7 @@
 </p:sld>
 </file>
 
-<file path=ppt/slides/slide23.xml><?xml version="1.0" encoding="utf-8"?>
+<file path=ppt/slides/slide21.xml><?xml version="1.0" encoding="utf-8"?>
 <p:sld xmlns:a="http://schemas.openxmlformats.org/drawingml/2006/main" xmlns:r="http://schemas.openxmlformats.org/officeDocument/2006/relationships" xmlns:p="http://schemas.openxmlformats.org/presentationml/2006/main">
   <p:cSld>
     <p:spTree>
@@ -4962,7 +4637,7 @@
 </p:sld>
 </file>
 
-<file path=ppt/slides/slide24.xml><?xml version="1.0" encoding="utf-8"?>
+<file path=ppt/slides/slide22.xml><?xml version="1.0" encoding="utf-8"?>
 <p:sld xmlns:a="http://schemas.openxmlformats.org/drawingml/2006/main" xmlns:r="http://schemas.openxmlformats.org/officeDocument/2006/relationships" xmlns:p="http://schemas.openxmlformats.org/presentationml/2006/main">
   <p:cSld>
     <p:spTree>
@@ -5478,7 +5153,7 @@
 </p:sld>
 </file>
 
-<file path=ppt/slides/slide25.xml><?xml version="1.0" encoding="utf-8"?>
+<file path=ppt/slides/slide23.xml><?xml version="1.0" encoding="utf-8"?>
 <p:sld xmlns:a="http://schemas.openxmlformats.org/drawingml/2006/main" xmlns:r="http://schemas.openxmlformats.org/officeDocument/2006/relationships" xmlns:p="http://schemas.openxmlformats.org/presentationml/2006/main">
   <p:cSld>
     <p:spTree>
@@ -5621,7 +5296,7 @@
 </p:sld>
 </file>
 
-<file path=ppt/slides/slide26.xml><?xml version="1.0" encoding="utf-8"?>
+<file path=ppt/slides/slide24.xml><?xml version="1.0" encoding="utf-8"?>
 <p:sld xmlns:a="http://schemas.openxmlformats.org/drawingml/2006/main" xmlns:r="http://schemas.openxmlformats.org/officeDocument/2006/relationships" xmlns:p="http://schemas.openxmlformats.org/presentationml/2006/main">
   <p:cSld>
     <p:spTree>
@@ -6077,7 +5752,7 @@
 </p:sld>
 </file>
 
-<file path=ppt/slides/slide27.xml><?xml version="1.0" encoding="utf-8"?>
+<file path=ppt/slides/slide25.xml><?xml version="1.0" encoding="utf-8"?>
 <p:sld xmlns:a="http://schemas.openxmlformats.org/drawingml/2006/main" xmlns:r="http://schemas.openxmlformats.org/officeDocument/2006/relationships" xmlns:p="http://schemas.openxmlformats.org/presentationml/2006/main">
   <p:cSld>
     <p:spTree>
@@ -6235,7 +5910,7 @@
 </p:sld>
 </file>
 
-<file path=ppt/slides/slide28.xml><?xml version="1.0" encoding="utf-8"?>
+<file path=ppt/slides/slide26.xml><?xml version="1.0" encoding="utf-8"?>
 <p:sld xmlns:a="http://schemas.openxmlformats.org/drawingml/2006/main" xmlns:r="http://schemas.openxmlformats.org/officeDocument/2006/relationships" xmlns:p="http://schemas.openxmlformats.org/presentationml/2006/main">
   <p:cSld>
     <p:spTree>
@@ -6437,7 +6112,7 @@
 </p:sld>
 </file>
 
-<file path=ppt/slides/slide29.xml><?xml version="1.0" encoding="utf-8"?>
+<file path=ppt/slides/slide27.xml><?xml version="1.0" encoding="utf-8"?>
 <p:sld xmlns:a="http://schemas.openxmlformats.org/drawingml/2006/main" xmlns:r="http://schemas.openxmlformats.org/officeDocument/2006/relationships" xmlns:p="http://schemas.openxmlformats.org/presentationml/2006/main">
   <p:cSld>
     <p:spTree>
@@ -6811,7 +6486,7 @@
       </p:grpSpPr>
       <p:sp>
         <p:nvSpPr>
-          <p:cNvPr id="2" name="Title 1"/>
+          <p:cNvPr id="4" name="Title 3"/>
           <p:cNvSpPr>
             <a:spLocks noGrp="1"/>
           </p:cNvSpPr>
@@ -6825,184 +6500,52 @@
           <a:lstStyle/>
           <a:p>
             <a:r>
-              <a:rPr lang="sk-SK" dirty="0"/>
-              <a:t>Príklad </a:t>
-            </a:r>
-            <a:r>
-              <a:rPr lang="sk-SK" dirty="0" smtClean="0"/>
-              <a:t>otázky </a:t>
-            </a:r>
-            <a:r>
-              <a:rPr lang="sk-SK" dirty="0"/>
-              <a:t>na témy z predchádzajúceho týždňa</a:t>
-            </a:r>
-            <a:endParaRPr lang="en-US" dirty="0"/>
-          </a:p>
-        </p:txBody>
-      </p:sp>
-      <p:sp>
-        <p:nvSpPr>
-          <p:cNvPr id="3" name="Content Placeholder 2"/>
-          <p:cNvSpPr>
-            <a:spLocks noGrp="1"/>
-          </p:cNvSpPr>
-          <p:nvPr>
-            <p:ph idx="1"/>
-          </p:nvPr>
-        </p:nvSpPr>
-        <p:spPr/>
-        <p:txBody>
-          <a:bodyPr/>
-          <a:lstStyle/>
-          <a:p>
-            <a:pPr marL="0" indent="0">
-              <a:buNone/>
-            </a:pPr>
-            <a:r>
-              <a:rPr lang="en-GB" dirty="0" err="1"/>
-              <a:t>Ktoré</a:t>
-            </a:r>
-            <a:r>
-              <a:rPr lang="en-GB" dirty="0"/>
-              <a:t> z </a:t>
-            </a:r>
-            <a:r>
-              <a:rPr lang="en-GB" dirty="0" err="1"/>
-              <a:t>týchto</a:t>
-            </a:r>
-            <a:r>
-              <a:rPr lang="en-GB" dirty="0"/>
+              <a:rPr lang="en-US" dirty="0" smtClean="0"/>
+              <a:t>Z</a:t>
+            </a:r>
+            <a:r>
+              <a:rPr lang="sk-SK" dirty="0" smtClean="0"/>
+              <a:t>í</a:t>
+            </a:r>
+            <a:r>
+              <a:rPr lang="en-US" dirty="0" err="1" smtClean="0"/>
+              <a:t>skavanie</a:t>
+            </a:r>
+            <a:r>
+              <a:rPr lang="en-US" dirty="0" smtClean="0"/>
               <a:t> </a:t>
             </a:r>
             <a:r>
-              <a:rPr lang="en-GB" dirty="0" err="1"/>
-              <a:t>metód</a:t>
-            </a:r>
-            <a:r>
-              <a:rPr lang="en-GB" dirty="0"/>
-              <a:t> je </a:t>
-            </a:r>
-            <a:r>
-              <a:rPr lang="en-GB" dirty="0" err="1"/>
-              <a:t>možné</a:t>
-            </a:r>
-            <a:r>
-              <a:rPr lang="en-GB" dirty="0"/>
-              <a:t> </a:t>
-            </a:r>
-            <a:r>
-              <a:rPr lang="en-GB" dirty="0" err="1"/>
-              <a:t>použiť</a:t>
-            </a:r>
-            <a:r>
-              <a:rPr lang="en-GB" dirty="0"/>
-              <a:t> </a:t>
-            </a:r>
-            <a:r>
-              <a:rPr lang="en-GB" dirty="0" err="1"/>
-              <a:t>na</a:t>
-            </a:r>
-            <a:r>
-              <a:rPr lang="en-GB" dirty="0"/>
-              <a:t> </a:t>
-            </a:r>
-            <a:r>
-              <a:rPr lang="en-GB" b="1" dirty="0" err="1" smtClean="0"/>
-              <a:t>párovú</a:t>
-            </a:r>
-            <a:r>
-              <a:rPr lang="en-GB" b="1" dirty="0" smtClean="0"/>
-              <a:t> </a:t>
-            </a:r>
-            <a:r>
-              <a:rPr lang="en-GB" b="1" dirty="0" err="1" smtClean="0"/>
-              <a:t>analýzu</a:t>
-            </a:r>
-            <a:r>
-              <a:rPr lang="en-GB" dirty="0" smtClean="0"/>
-              <a:t> </a:t>
-            </a:r>
-            <a:r>
-              <a:rPr lang="en-GB" dirty="0" err="1"/>
-              <a:t>dvoch</a:t>
-            </a:r>
-            <a:r>
-              <a:rPr lang="en-GB" dirty="0"/>
-              <a:t> </a:t>
-            </a:r>
-            <a:r>
-              <a:rPr lang="en-GB" dirty="0" err="1"/>
-              <a:t>spojitých</a:t>
-            </a:r>
-            <a:r>
-              <a:rPr lang="en-GB" dirty="0"/>
-              <a:t> </a:t>
-            </a:r>
-            <a:r>
-              <a:rPr lang="en-GB" dirty="0" err="1"/>
-              <a:t>atribútov</a:t>
-            </a:r>
-            <a:r>
-              <a:rPr lang="en-GB" dirty="0" smtClean="0"/>
-              <a:t>?</a:t>
-            </a:r>
-            <a:endParaRPr lang="sk-SK" dirty="0" smtClean="0"/>
-          </a:p>
-          <a:p>
-            <a:pPr lvl="1"/>
-            <a:r>
-              <a:rPr lang="sk-SK" dirty="0" smtClean="0"/>
-              <a:t>Histogram</a:t>
-            </a:r>
-          </a:p>
-          <a:p>
-            <a:pPr lvl="1"/>
-            <a:r>
-              <a:rPr lang="sk-SK" dirty="0" smtClean="0"/>
-              <a:t>Stĺpcový graf</a:t>
-            </a:r>
-          </a:p>
-          <a:p>
-            <a:pPr lvl="1"/>
-            <a:r>
-              <a:rPr lang="sk-SK" dirty="0" err="1" smtClean="0"/>
-              <a:t>Boxplot</a:t>
-            </a:r>
-            <a:endParaRPr lang="sk-SK" dirty="0" smtClean="0"/>
-          </a:p>
-          <a:p>
-            <a:pPr lvl="1"/>
-            <a:r>
-              <a:rPr lang="sk-SK" dirty="0" err="1" smtClean="0"/>
-              <a:t>Scatterplot</a:t>
-            </a:r>
-            <a:endParaRPr lang="sk-SK" dirty="0" smtClean="0"/>
-          </a:p>
-          <a:p>
-            <a:pPr lvl="1"/>
-            <a:r>
-              <a:rPr lang="sk-SK" dirty="0" smtClean="0"/>
-              <a:t>Frekvenčná (kontingenčná) tabuľka</a:t>
-            </a:r>
-          </a:p>
-          <a:p>
-            <a:pPr lvl="1"/>
-            <a:r>
-              <a:rPr lang="sk-SK" dirty="0" err="1" smtClean="0"/>
-              <a:t>Pearsonov</a:t>
-            </a:r>
-            <a:r>
-              <a:rPr lang="sk-SK" dirty="0" smtClean="0"/>
-              <a:t> korelačný koeficient</a:t>
+              <a:rPr lang="sk-SK" dirty="0" smtClean="0"/>
+              <a:t>a prepájanie dát</a:t>
             </a:r>
             <a:endParaRPr lang="en-GB" dirty="0"/>
+          </a:p>
+        </p:txBody>
+      </p:sp>
+      <p:sp>
+        <p:nvSpPr>
+          <p:cNvPr id="5" name="Text Placeholder 4"/>
+          <p:cNvSpPr>
+            <a:spLocks noGrp="1"/>
+          </p:cNvSpPr>
+          <p:nvPr>
+            <p:ph type="body" idx="1"/>
+          </p:nvPr>
+        </p:nvSpPr>
+        <p:spPr/>
+        <p:txBody>
+          <a:bodyPr/>
+          <a:lstStyle/>
+          <a:p>
+            <a:endParaRPr lang="en-GB"/>
           </a:p>
         </p:txBody>
       </p:sp>
     </p:spTree>
     <p:extLst>
       <p:ext uri="{BB962C8B-B14F-4D97-AF65-F5344CB8AC3E}">
-        <p14:creationId xmlns:p14="http://schemas.microsoft.com/office/powerpoint/2010/main" val="2662268137"/>
+        <p14:creationId xmlns:p14="http://schemas.microsoft.com/office/powerpoint/2010/main" val="1284884721"/>
       </p:ext>
     </p:extLst>
   </p:cSld>
@@ -7046,346 +6589,149 @@
             <p:ph type="title"/>
           </p:nvPr>
         </p:nvSpPr>
-        <p:spPr>
-          <a:xfrm>
-            <a:off x="838200" y="591628"/>
-            <a:ext cx="10515600" cy="1325563"/>
-          </a:xfrm>
-        </p:spPr>
+        <p:spPr/>
+        <p:txBody>
+          <a:bodyPr/>
+          <a:lstStyle/>
+          <a:p>
+            <a:r>
+              <a:rPr lang="sk-SK" dirty="0" smtClean="0"/>
+              <a:t>ETL (</a:t>
+            </a:r>
+            <a:r>
+              <a:rPr lang="sk-SK" dirty="0" err="1" smtClean="0"/>
+              <a:t>Extract</a:t>
+            </a:r>
+            <a:r>
+              <a:rPr lang="sk-SK" dirty="0" smtClean="0"/>
+              <a:t>, </a:t>
+            </a:r>
+            <a:r>
+              <a:rPr lang="sk-SK" dirty="0" err="1" smtClean="0"/>
+              <a:t>Transform</a:t>
+            </a:r>
+            <a:r>
+              <a:rPr lang="sk-SK" dirty="0" smtClean="0"/>
+              <a:t>, </a:t>
+            </a:r>
+            <a:r>
+              <a:rPr lang="sk-SK" dirty="0" err="1" smtClean="0"/>
+              <a:t>Load</a:t>
+            </a:r>
+            <a:r>
+              <a:rPr lang="sk-SK" dirty="0" smtClean="0"/>
+              <a:t>)</a:t>
+            </a:r>
+            <a:endParaRPr lang="en-US" dirty="0"/>
+          </a:p>
+        </p:txBody>
+      </p:sp>
+      <p:sp>
+        <p:nvSpPr>
+          <p:cNvPr id="3" name="Content Placeholder 2"/>
+          <p:cNvSpPr>
+            <a:spLocks noGrp="1"/>
+          </p:cNvSpPr>
+          <p:nvPr>
+            <p:ph idx="1"/>
+          </p:nvPr>
+        </p:nvSpPr>
+        <p:spPr/>
         <p:txBody>
           <a:bodyPr>
-            <a:normAutofit fontScale="90000"/>
+            <a:normAutofit lnSpcReduction="10000"/>
           </a:bodyPr>
           <a:lstStyle/>
           <a:p>
             <a:r>
               <a:rPr lang="sk-SK" dirty="0" smtClean="0"/>
-              <a:t>Príklad otázky, ktorá je príliš zákerná na to aby sme vám ju dali na skúške, ale ktorej je mi ľúto nikde nepoužiť pretože si myslím, že je vtipná.</a:t>
-            </a:r>
-            <a:r>
-              <a:rPr lang="en-US" dirty="0" smtClean="0"/>
-              <a:t/>
-            </a:r>
-            <a:br>
-              <a:rPr lang="en-US" dirty="0" smtClean="0"/>
-            </a:br>
-            <a:r>
-              <a:rPr lang="sk-SK" sz="2000" dirty="0"/>
-              <a:t>Áno, myslím si, že je vtipná preto, lebo som ju vymyslel ja </a:t>
-            </a:r>
-            <a:r>
-              <a:rPr lang="en-US" sz="2000" dirty="0" smtClean="0">
-                <a:sym typeface="Wingdings" panose="05000000000000000000" pitchFamily="2" charset="2"/>
-              </a:rPr>
-              <a:t></a:t>
-            </a:r>
-            <a:endParaRPr lang="en-GB" dirty="0"/>
-          </a:p>
-        </p:txBody>
-      </p:sp>
-      <p:sp>
-        <p:nvSpPr>
-          <p:cNvPr id="3" name="Content Placeholder 2"/>
-          <p:cNvSpPr>
-            <a:spLocks noGrp="1"/>
-          </p:cNvSpPr>
-          <p:nvPr>
-            <p:ph idx="1"/>
-          </p:nvPr>
-        </p:nvSpPr>
-        <p:spPr>
-          <a:xfrm>
-            <a:off x="838200" y="2818701"/>
-            <a:ext cx="10515600" cy="3358262"/>
-          </a:xfrm>
-        </p:spPr>
-        <p:txBody>
-          <a:bodyPr>
-            <a:normAutofit/>
-          </a:bodyPr>
-          <a:lstStyle/>
+              <a:t>Termín sa používa hlavne v súvislosti s </a:t>
+            </a:r>
+            <a:r>
+              <a:rPr lang="sk-SK" dirty="0" err="1" smtClean="0"/>
+              <a:t>Data</a:t>
+            </a:r>
+            <a:r>
+              <a:rPr lang="sk-SK" dirty="0" smtClean="0"/>
+              <a:t> </a:t>
+            </a:r>
+            <a:r>
+              <a:rPr lang="sk-SK" dirty="0" err="1" smtClean="0"/>
+              <a:t>Warehousingom</a:t>
+            </a:r>
+            <a:endParaRPr lang="sk-SK" dirty="0" smtClean="0"/>
+          </a:p>
+          <a:p>
+            <a:pPr lvl="1"/>
+            <a:r>
+              <a:rPr lang="sk-SK" dirty="0" smtClean="0"/>
+              <a:t>Podrobne sa rozoberá na predmete Pokročilé databázové systémy</a:t>
+            </a:r>
+          </a:p>
+          <a:p>
+            <a:r>
+              <a:rPr lang="sk-SK" dirty="0" smtClean="0"/>
+              <a:t>Tu sa ideme rozprávať len o základných konceptoch a niektorých technikách, ktoré sa nám hodia</a:t>
+            </a:r>
+          </a:p>
+          <a:p>
+            <a:endParaRPr lang="sk-SK" dirty="0"/>
+          </a:p>
           <a:p>
             <a:pPr marL="0" indent="0">
               <a:buNone/>
             </a:pPr>
             <a:r>
-              <a:rPr lang="en-GB" dirty="0" err="1" smtClean="0"/>
-              <a:t>Pearsnova</a:t>
-            </a:r>
-            <a:r>
-              <a:rPr lang="en-GB" dirty="0" smtClean="0"/>
-              <a:t> </a:t>
-            </a:r>
-            <a:r>
-              <a:rPr lang="en-GB" dirty="0" err="1" smtClean="0"/>
-              <a:t>korelácia</a:t>
-            </a:r>
-            <a:r>
-              <a:rPr lang="en-GB" dirty="0" smtClean="0"/>
-              <a:t> </a:t>
-            </a:r>
-            <a:r>
-              <a:rPr lang="en-GB" dirty="0" err="1"/>
-              <a:t>medzi</a:t>
-            </a:r>
-            <a:r>
-              <a:rPr lang="en-GB" dirty="0"/>
-              <a:t> </a:t>
-            </a:r>
-            <a:r>
-              <a:rPr lang="en-GB" dirty="0" err="1"/>
-              <a:t>vekom</a:t>
-            </a:r>
-            <a:r>
-              <a:rPr lang="en-GB" dirty="0"/>
-              <a:t> a </a:t>
-            </a:r>
-            <a:r>
-              <a:rPr lang="en-GB" dirty="0" err="1"/>
-              <a:t>zdravím</a:t>
-            </a:r>
-            <a:r>
-              <a:rPr lang="en-GB" dirty="0"/>
-              <a:t> </a:t>
-            </a:r>
-            <a:r>
-              <a:rPr lang="en-GB" dirty="0" err="1"/>
-              <a:t>osôb</a:t>
-            </a:r>
-            <a:r>
-              <a:rPr lang="en-GB" dirty="0"/>
-              <a:t> v </a:t>
-            </a:r>
-            <a:r>
-              <a:rPr lang="en-GB" dirty="0" err="1"/>
-              <a:t>našom</a:t>
-            </a:r>
-            <a:r>
-              <a:rPr lang="en-GB" dirty="0"/>
-              <a:t> </a:t>
-            </a:r>
-            <a:r>
-              <a:rPr lang="en-GB" dirty="0" err="1"/>
-              <a:t>datasete</a:t>
-            </a:r>
-            <a:r>
-              <a:rPr lang="en-GB" dirty="0"/>
-              <a:t> je </a:t>
-            </a:r>
-            <a:r>
-              <a:rPr lang="en-GB" dirty="0" smtClean="0"/>
-              <a:t>  -1,09</a:t>
-            </a:r>
-            <a:r>
-              <a:rPr lang="en-GB" dirty="0"/>
-              <a:t>. </a:t>
-            </a:r>
-            <a:r>
-              <a:rPr lang="en-GB" dirty="0" err="1"/>
-              <a:t>Čo</a:t>
-            </a:r>
-            <a:r>
-              <a:rPr lang="en-GB" dirty="0"/>
-              <a:t> </a:t>
-            </a:r>
-            <a:r>
-              <a:rPr lang="en-GB" dirty="0" err="1"/>
-              <a:t>na</a:t>
-            </a:r>
-            <a:r>
-              <a:rPr lang="en-GB" dirty="0"/>
-              <a:t> </a:t>
-            </a:r>
-            <a:r>
-              <a:rPr lang="en-GB" dirty="0" err="1"/>
-              <a:t>základe</a:t>
-            </a:r>
-            <a:r>
-              <a:rPr lang="en-GB" dirty="0"/>
-              <a:t> </a:t>
-            </a:r>
-            <a:r>
-              <a:rPr lang="en-GB" dirty="0" err="1"/>
-              <a:t>tohto</a:t>
-            </a:r>
-            <a:r>
-              <a:rPr lang="en-GB" dirty="0"/>
-              <a:t> </a:t>
-            </a:r>
-            <a:r>
-              <a:rPr lang="en-GB" dirty="0" err="1"/>
-              <a:t>tvrdenia</a:t>
-            </a:r>
-            <a:r>
-              <a:rPr lang="en-GB" dirty="0"/>
-              <a:t> </a:t>
-            </a:r>
-            <a:r>
-              <a:rPr lang="en-GB" dirty="0" err="1"/>
-              <a:t>môžeme</a:t>
-            </a:r>
-            <a:r>
-              <a:rPr lang="en-GB" dirty="0"/>
-              <a:t> </a:t>
-            </a:r>
-            <a:r>
-              <a:rPr lang="en-GB" dirty="0" err="1"/>
-              <a:t>povedať</a:t>
-            </a:r>
-            <a:r>
-              <a:rPr lang="en-GB" dirty="0" smtClean="0"/>
-              <a:t>?</a:t>
-            </a:r>
-            <a:endParaRPr lang="sk-SK" dirty="0" smtClean="0"/>
-          </a:p>
-          <a:p>
-            <a:pPr lvl="1"/>
-            <a:r>
-              <a:rPr lang="pl-PL" dirty="0"/>
-              <a:t>Vek je dobrý prediktor </a:t>
-            </a:r>
-            <a:r>
-              <a:rPr lang="pl-PL" dirty="0" smtClean="0"/>
-              <a:t>zdravia</a:t>
-            </a:r>
-          </a:p>
-          <a:p>
-            <a:pPr lvl="1"/>
-            <a:r>
-              <a:rPr lang="en-GB" dirty="0" err="1"/>
-              <a:t>Vek</a:t>
-            </a:r>
-            <a:r>
-              <a:rPr lang="en-GB" dirty="0"/>
-              <a:t> je </a:t>
-            </a:r>
-            <a:r>
-              <a:rPr lang="en-GB" dirty="0" err="1"/>
-              <a:t>zlý</a:t>
-            </a:r>
-            <a:r>
-              <a:rPr lang="en-GB" dirty="0"/>
-              <a:t> </a:t>
-            </a:r>
-            <a:r>
-              <a:rPr lang="en-GB" dirty="0" err="1"/>
-              <a:t>prediktor</a:t>
-            </a:r>
-            <a:r>
-              <a:rPr lang="en-GB" dirty="0"/>
-              <a:t> </a:t>
-            </a:r>
-            <a:r>
-              <a:rPr lang="en-GB" dirty="0" err="1" smtClean="0"/>
-              <a:t>zdravia</a:t>
-            </a:r>
-            <a:endParaRPr lang="sk-SK" dirty="0" smtClean="0"/>
-          </a:p>
-          <a:p>
-            <a:pPr lvl="1"/>
-            <a:r>
-              <a:rPr lang="sk-SK" dirty="0" smtClean="0"/>
-              <a:t>Možnosť 1 a aj 2 sú správne</a:t>
-            </a:r>
-          </a:p>
-          <a:p>
-            <a:pPr lvl="1"/>
-            <a:r>
-              <a:rPr lang="en-GB" dirty="0" err="1"/>
-              <a:t>Škola</a:t>
-            </a:r>
-            <a:r>
-              <a:rPr lang="en-GB" dirty="0"/>
-              <a:t> </a:t>
-            </a:r>
-            <a:r>
-              <a:rPr lang="en-GB" dirty="0" err="1"/>
-              <a:t>hrou</a:t>
-            </a:r>
-            <a:r>
-              <a:rPr lang="en-GB" dirty="0"/>
-              <a:t> je </a:t>
-            </a:r>
-            <a:r>
-              <a:rPr lang="en-GB" dirty="0" err="1"/>
-              <a:t>efektivna</a:t>
-            </a:r>
-            <a:r>
-              <a:rPr lang="en-GB" dirty="0"/>
-              <a:t> </a:t>
-            </a:r>
-            <a:r>
-              <a:rPr lang="en-GB" dirty="0" err="1"/>
-              <a:t>metóda</a:t>
-            </a:r>
-            <a:r>
-              <a:rPr lang="en-GB" dirty="0"/>
-              <a:t> </a:t>
-            </a:r>
-            <a:r>
-              <a:rPr lang="en-GB" dirty="0" err="1" smtClean="0"/>
-              <a:t>vyučovania</a:t>
-            </a:r>
-            <a:endParaRPr lang="sk-SK" dirty="0" smtClean="0"/>
-          </a:p>
-          <a:p>
-            <a:pPr lvl="1"/>
-            <a:r>
-              <a:rPr lang="en-GB" dirty="0" err="1"/>
-              <a:t>Prednášajúci</a:t>
-            </a:r>
-            <a:r>
-              <a:rPr lang="en-GB" dirty="0"/>
-              <a:t> </a:t>
-            </a:r>
-            <a:r>
-              <a:rPr lang="en-GB" dirty="0" err="1"/>
-              <a:t>sú</a:t>
-            </a:r>
-            <a:r>
-              <a:rPr lang="en-GB" dirty="0"/>
-              <a:t> </a:t>
-            </a:r>
-            <a:r>
-              <a:rPr lang="en-GB" dirty="0" err="1" smtClean="0"/>
-              <a:t>trolovia</a:t>
-            </a:r>
-            <a:endParaRPr lang="sk-SK" dirty="0"/>
-          </a:p>
-          <a:p>
-            <a:pPr lvl="1"/>
-            <a:r>
-              <a:rPr lang="en-GB" dirty="0" err="1"/>
-              <a:t>Všetky</a:t>
-            </a:r>
-            <a:r>
-              <a:rPr lang="en-GB" dirty="0"/>
-              <a:t> </a:t>
-            </a:r>
-            <a:r>
-              <a:rPr lang="en-GB" dirty="0" err="1"/>
-              <a:t>možnosti</a:t>
-            </a:r>
-            <a:endParaRPr lang="sk-SK" dirty="0" smtClean="0"/>
+              <a:rPr lang="sk-SK" b="1" dirty="0" err="1" smtClean="0"/>
+              <a:t>Extract</a:t>
+            </a:r>
+            <a:r>
+              <a:rPr lang="sk-SK" dirty="0" smtClean="0"/>
+              <a:t> – vytiahnuť dáta zo zdrojových systémov</a:t>
+            </a:r>
           </a:p>
           <a:p>
             <a:pPr marL="0" indent="0">
               <a:buNone/>
             </a:pPr>
-            <a:endParaRPr lang="sk-SK" dirty="0" smtClean="0"/>
+            <a:r>
+              <a:rPr lang="sk-SK" b="1" dirty="0" err="1" smtClean="0"/>
+              <a:t>Transform</a:t>
+            </a:r>
+            <a:r>
+              <a:rPr lang="sk-SK" dirty="0" smtClean="0"/>
+              <a:t> – Pospájať, opraviť / vyčistiť, skonsolidovať dáta do jednotnej formy</a:t>
+            </a:r>
           </a:p>
           <a:p>
             <a:pPr marL="0" indent="0">
               <a:buNone/>
             </a:pPr>
-            <a:endParaRPr lang="sk-SK" dirty="0"/>
+            <a:r>
+              <a:rPr lang="sk-SK" b="1" dirty="0" err="1" smtClean="0"/>
+              <a:t>Load</a:t>
+            </a:r>
+            <a:r>
+              <a:rPr lang="sk-SK" dirty="0" smtClean="0"/>
+              <a:t> – uložiť do podoby, ktorá sa nám najviac hodí na spracovanie</a:t>
+            </a:r>
+          </a:p>
+          <a:p>
+            <a:pPr marL="0" indent="0">
+              <a:buNone/>
+            </a:pPr>
+            <a:r>
+              <a:rPr lang="sk-SK" dirty="0"/>
+              <a:t>	</a:t>
+            </a:r>
+            <a:endParaRPr lang="en-US" dirty="0"/>
           </a:p>
         </p:txBody>
       </p:sp>
     </p:spTree>
     <p:extLst>
       <p:ext uri="{BB962C8B-B14F-4D97-AF65-F5344CB8AC3E}">
-        <p14:creationId xmlns:p14="http://schemas.microsoft.com/office/powerpoint/2010/main" val="462084728"/>
+        <p14:creationId xmlns:p14="http://schemas.microsoft.com/office/powerpoint/2010/main" val="1845490483"/>
       </p:ext>
     </p:extLst>
   </p:cSld>
@@ -7421,7 +6767,7 @@
       </p:grpSpPr>
       <p:sp>
         <p:nvSpPr>
-          <p:cNvPr id="4" name="Title 3"/>
+          <p:cNvPr id="2" name="Title 1"/>
           <p:cNvSpPr>
             <a:spLocks noGrp="1"/>
           </p:cNvSpPr>
@@ -7434,53 +6780,92 @@
           <a:bodyPr/>
           <a:lstStyle/>
           <a:p>
-            <a:r>
-              <a:rPr lang="en-US" dirty="0" smtClean="0"/>
-              <a:t>Z</a:t>
-            </a:r>
-            <a:r>
-              <a:rPr lang="sk-SK" dirty="0" smtClean="0"/>
-              <a:t>í</a:t>
-            </a:r>
-            <a:r>
-              <a:rPr lang="en-US" dirty="0" err="1" smtClean="0"/>
-              <a:t>skavanie</a:t>
-            </a:r>
-            <a:r>
-              <a:rPr lang="en-US" dirty="0" smtClean="0"/>
+            <a:endParaRPr lang="en-US"/>
+          </a:p>
+        </p:txBody>
+      </p:sp>
+      <p:sp>
+        <p:nvSpPr>
+          <p:cNvPr id="3" name="Content Placeholder 2"/>
+          <p:cNvSpPr>
+            <a:spLocks noGrp="1"/>
+          </p:cNvSpPr>
+          <p:nvPr>
+            <p:ph idx="1"/>
+          </p:nvPr>
+        </p:nvSpPr>
+        <p:spPr/>
+        <p:txBody>
+          <a:bodyPr/>
+          <a:lstStyle/>
+          <a:p>
+            <a:r>
+              <a:rPr lang="sk-SK" dirty="0" smtClean="0"/>
+              <a:t>V praxi veľké, komplikované systémy prepájajúce množstvo rôznorodých zdrojov</a:t>
+            </a:r>
+          </a:p>
+          <a:p>
+            <a:r>
+              <a:rPr lang="sk-SK" dirty="0" smtClean="0"/>
+              <a:t>SQL procedúry, transformácie pomocou skriptov, </a:t>
+            </a:r>
+            <a:r>
+              <a:rPr lang="sk-SK" dirty="0" err="1" smtClean="0"/>
+              <a:t>Message</a:t>
+            </a:r>
+            <a:r>
+              <a:rPr lang="sk-SK" dirty="0" smtClean="0"/>
               <a:t> </a:t>
             </a:r>
             <a:r>
-              <a:rPr lang="sk-SK" dirty="0" smtClean="0"/>
-              <a:t>a prepájanie dát</a:t>
-            </a:r>
-            <a:endParaRPr lang="en-GB" dirty="0"/>
-          </a:p>
-        </p:txBody>
-      </p:sp>
-      <p:sp>
-        <p:nvSpPr>
-          <p:cNvPr id="5" name="Text Placeholder 4"/>
-          <p:cNvSpPr>
-            <a:spLocks noGrp="1"/>
-          </p:cNvSpPr>
-          <p:nvPr>
-            <p:ph type="body" idx="1"/>
-          </p:nvPr>
-        </p:nvSpPr>
-        <p:spPr/>
-        <p:txBody>
-          <a:bodyPr/>
-          <a:lstStyle/>
-          <a:p>
-            <a:endParaRPr lang="en-GB"/>
+              <a:rPr lang="sk-SK" dirty="0" err="1" smtClean="0"/>
+              <a:t>Queue</a:t>
+            </a:r>
+            <a:r>
+              <a:rPr lang="sk-SK" dirty="0" smtClean="0"/>
+              <a:t> (Kafka), </a:t>
+            </a:r>
+            <a:r>
+              <a:rPr lang="sk-SK" dirty="0" err="1" smtClean="0"/>
+              <a:t>Spark</a:t>
+            </a:r>
+            <a:endParaRPr lang="sk-SK" dirty="0" smtClean="0"/>
+          </a:p>
+          <a:p>
+            <a:r>
+              <a:rPr lang="sk-SK" dirty="0" smtClean="0"/>
+              <a:t>Výsledok sú tabuľky v nejakom distribuovanom súborovom systéme. Ideálne v podobe </a:t>
+            </a:r>
+            <a:r>
+              <a:rPr lang="sk-SK" dirty="0" err="1" smtClean="0"/>
+              <a:t>Star</a:t>
+            </a:r>
+            <a:r>
+              <a:rPr lang="sk-SK" dirty="0" smtClean="0"/>
+              <a:t>-schémy</a:t>
+            </a:r>
+          </a:p>
+          <a:p>
+            <a:r>
+              <a:rPr lang="sk-SK" dirty="0" smtClean="0"/>
+              <a:t>Dopytovanie najčastejšie pomocou SQL alebo </a:t>
+            </a:r>
+            <a:r>
+              <a:rPr lang="sk-SK" dirty="0" err="1" smtClean="0"/>
+              <a:t>MapReduce</a:t>
+            </a:r>
+            <a:r>
+              <a:rPr lang="sk-SK" dirty="0" smtClean="0"/>
+              <a:t> úloh (alebo jazyku prekladaného do MR úloh)</a:t>
+            </a:r>
+            <a:endParaRPr lang="en-US" dirty="0"/>
           </a:p>
         </p:txBody>
       </p:sp>
     </p:spTree>
     <p:extLst>
       <p:ext uri="{BB962C8B-B14F-4D97-AF65-F5344CB8AC3E}">
-        <p14:creationId xmlns:p14="http://schemas.microsoft.com/office/powerpoint/2010/main" val="1284884721"/>
+        <p14:creationId xmlns:p14="http://schemas.microsoft.com/office/powerpoint/2010/main" val="456617093"/>
       </p:ext>
     </p:extLst>
   </p:cSld>
@@ -7530,134 +6915,190 @@
           <a:lstStyle/>
           <a:p>
             <a:r>
-              <a:rPr lang="sk-SK" dirty="0" smtClean="0"/>
-              <a:t>ETL (</a:t>
-            </a:r>
-            <a:r>
               <a:rPr lang="sk-SK" dirty="0" err="1" smtClean="0"/>
-              <a:t>Extract</a:t>
-            </a:r>
-            <a:r>
-              <a:rPr lang="sk-SK" dirty="0" smtClean="0"/>
-              <a:t>, </a:t>
-            </a:r>
-            <a:r>
-              <a:rPr lang="sk-SK" dirty="0" err="1" smtClean="0"/>
-              <a:t>Transform</a:t>
-            </a:r>
-            <a:r>
-              <a:rPr lang="sk-SK" dirty="0" smtClean="0"/>
-              <a:t>, </a:t>
-            </a:r>
-            <a:r>
-              <a:rPr lang="sk-SK" dirty="0" err="1" smtClean="0"/>
-              <a:t>Load</a:t>
-            </a:r>
-            <a:r>
-              <a:rPr lang="sk-SK" dirty="0" smtClean="0"/>
+              <a:t>Star</a:t>
+            </a:r>
+            <a:r>
+              <a:rPr lang="sk-SK" dirty="0" smtClean="0"/>
+              <a:t>-schéma</a:t>
+            </a:r>
+            <a:endParaRPr lang="en-US" dirty="0"/>
+          </a:p>
+        </p:txBody>
+      </p:sp>
+      <p:pic>
+        <p:nvPicPr>
+          <p:cNvPr id="1026" name="Picture 2" descr="https://upload.wikimedia.org/wikipedia/en/f/fe/Star-schema-example.png"/>
+          <p:cNvPicPr>
+            <a:picLocks noChangeAspect="1" noChangeArrowheads="1"/>
+          </p:cNvPicPr>
+          <p:nvPr/>
+        </p:nvPicPr>
+        <p:blipFill>
+          <a:blip r:embed="rId2">
+            <a:extLst>
+              <a:ext uri="{28A0092B-C50C-407E-A947-70E740481C1C}">
+                <a14:useLocalDpi xmlns:a14="http://schemas.microsoft.com/office/drawing/2010/main" val="0"/>
+              </a:ext>
+            </a:extLst>
+          </a:blip>
+          <a:srcRect/>
+          <a:stretch>
+            <a:fillRect/>
+          </a:stretch>
+        </p:blipFill>
+        <p:spPr bwMode="auto">
+          <a:xfrm>
+            <a:off x="4515926" y="1676849"/>
+            <a:ext cx="7676074" cy="4648890"/>
+          </a:xfrm>
+          <a:prstGeom prst="rect">
+            <a:avLst/>
+          </a:prstGeom>
+          <a:noFill/>
+          <a:extLst>
+            <a:ext uri="{909E8E84-426E-40DD-AFC4-6F175D3DCCD1}">
+              <a14:hiddenFill xmlns:a14="http://schemas.microsoft.com/office/drawing/2010/main">
+                <a:solidFill>
+                  <a:srgbClr val="FFFFFF"/>
+                </a:solidFill>
+              </a14:hiddenFill>
+            </a:ext>
+          </a:extLst>
+        </p:spPr>
+      </p:pic>
+      <p:sp>
+        <p:nvSpPr>
+          <p:cNvPr id="5" name="Content Placeholder 2"/>
+          <p:cNvSpPr>
+            <a:spLocks noGrp="1"/>
+          </p:cNvSpPr>
+          <p:nvPr>
+            <p:ph idx="1"/>
+          </p:nvPr>
+        </p:nvSpPr>
+        <p:spPr>
+          <a:xfrm>
+            <a:off x="838200" y="1825625"/>
+            <a:ext cx="3783496" cy="4351338"/>
+          </a:xfrm>
+        </p:spPr>
+        <p:txBody>
+          <a:bodyPr>
+            <a:normAutofit/>
+          </a:bodyPr>
+          <a:lstStyle/>
+          <a:p>
+            <a:r>
+              <a:rPr lang="sk-SK" sz="2400" dirty="0" smtClean="0"/>
+              <a:t>Tabuľka faktov a dimenzií</a:t>
+            </a:r>
+          </a:p>
+          <a:p>
+            <a:r>
+              <a:rPr lang="sk-SK" sz="2400" dirty="0" smtClean="0"/>
+              <a:t>Dopyty v jednotnej forme (</a:t>
+            </a:r>
+            <a:r>
+              <a:rPr lang="sk-SK" sz="2400" dirty="0" err="1" smtClean="0"/>
+              <a:t>select</a:t>
+            </a:r>
+            <a:r>
+              <a:rPr lang="sk-SK" sz="2400" dirty="0" smtClean="0"/>
+              <a:t> + </a:t>
+            </a:r>
+            <a:r>
+              <a:rPr lang="sk-SK" sz="2400" dirty="0" err="1" smtClean="0"/>
+              <a:t>inner</a:t>
+            </a:r>
+            <a:r>
+              <a:rPr lang="sk-SK" sz="2400" dirty="0" smtClean="0"/>
+              <a:t> </a:t>
+            </a:r>
+            <a:r>
+              <a:rPr lang="sk-SK" sz="2400" dirty="0" err="1" smtClean="0"/>
+              <a:t>join</a:t>
+            </a:r>
+            <a:r>
+              <a:rPr lang="sk-SK" sz="2400" dirty="0" smtClean="0"/>
+              <a:t> + </a:t>
+            </a:r>
+            <a:r>
+              <a:rPr lang="sk-SK" sz="2400" dirty="0" err="1" smtClean="0"/>
+              <a:t>where</a:t>
+            </a:r>
+            <a:r>
+              <a:rPr lang="sk-SK" sz="2400" dirty="0" smtClean="0"/>
+              <a:t> + </a:t>
+            </a:r>
+            <a:r>
+              <a:rPr lang="sk-SK" sz="2400" dirty="0" err="1" smtClean="0"/>
+              <a:t>group</a:t>
+            </a:r>
+            <a:r>
+              <a:rPr lang="sk-SK" sz="2400" dirty="0" smtClean="0"/>
+              <a:t> by + </a:t>
+            </a:r>
+            <a:r>
+              <a:rPr lang="sk-SK" sz="2400" dirty="0" err="1" smtClean="0"/>
+              <a:t>agg</a:t>
+            </a:r>
+            <a:r>
+              <a:rPr lang="sk-SK" sz="2400" dirty="0" smtClean="0"/>
               <a:t>)</a:t>
             </a:r>
-            <a:endParaRPr lang="en-US" dirty="0"/>
-          </a:p>
-        </p:txBody>
-      </p:sp>
-      <p:sp>
-        <p:nvSpPr>
-          <p:cNvPr id="3" name="Content Placeholder 2"/>
-          <p:cNvSpPr>
-            <a:spLocks noGrp="1"/>
-          </p:cNvSpPr>
-          <p:nvPr>
-            <p:ph idx="1"/>
-          </p:nvPr>
-        </p:nvSpPr>
-        <p:spPr/>
-        <p:txBody>
-          <a:bodyPr>
-            <a:normAutofit lnSpcReduction="10000"/>
+          </a:p>
+          <a:p>
+            <a:r>
+              <a:rPr lang="sk-SK" sz="2400" dirty="0" smtClean="0"/>
+              <a:t>Šetrí miesto a dá sa pomerne rýchlo vyhodnocovať</a:t>
+            </a:r>
+          </a:p>
+          <a:p>
+            <a:r>
+              <a:rPr lang="sk-SK" sz="2400" dirty="0" smtClean="0"/>
+              <a:t>=&gt; </a:t>
+            </a:r>
+            <a:r>
+              <a:rPr lang="sk-SK" sz="2400" dirty="0" err="1" smtClean="0"/>
+              <a:t>Snowflake</a:t>
+            </a:r>
+            <a:r>
+              <a:rPr lang="sk-SK" sz="2400" dirty="0" smtClean="0"/>
+              <a:t> schéma</a:t>
+            </a:r>
+            <a:endParaRPr lang="en-US" sz="2400" dirty="0"/>
+          </a:p>
+        </p:txBody>
+      </p:sp>
+      <p:sp>
+        <p:nvSpPr>
+          <p:cNvPr id="4" name="Rectangle 3"/>
+          <p:cNvSpPr/>
+          <p:nvPr/>
+        </p:nvSpPr>
+        <p:spPr>
+          <a:xfrm>
+            <a:off x="4621696" y="6325739"/>
+            <a:ext cx="5229060" cy="369332"/>
+          </a:xfrm>
+          <a:prstGeom prst="rect">
+            <a:avLst/>
+          </a:prstGeom>
+        </p:spPr>
+        <p:txBody>
+          <a:bodyPr wrap="none">
+            <a:spAutoFit/>
           </a:bodyPr>
           <a:lstStyle/>
           <a:p>
             <a:r>
               <a:rPr lang="sk-SK" dirty="0" smtClean="0"/>
-              <a:t>Termín sa používa hlavne v súvislosti s </a:t>
-            </a:r>
-            <a:r>
-              <a:rPr lang="sk-SK" dirty="0" err="1" smtClean="0"/>
-              <a:t>Data</a:t>
-            </a:r>
-            <a:r>
-              <a:rPr lang="sk-SK" dirty="0" smtClean="0"/>
-              <a:t> </a:t>
-            </a:r>
-            <a:r>
-              <a:rPr lang="sk-SK" dirty="0" err="1" smtClean="0"/>
-              <a:t>Warehousingom</a:t>
-            </a:r>
-            <a:endParaRPr lang="sk-SK" dirty="0" smtClean="0"/>
-          </a:p>
-          <a:p>
-            <a:pPr lvl="1"/>
-            <a:r>
-              <a:rPr lang="sk-SK" dirty="0" smtClean="0"/>
-              <a:t>Podrobne sa rozoberá na predmete Pokročilé databázové systémy</a:t>
-            </a:r>
-          </a:p>
-          <a:p>
-            <a:r>
-              <a:rPr lang="sk-SK" dirty="0" smtClean="0"/>
-              <a:t>Tu sa ideme rozprávať len o základných konceptoch a niektorých technikách, ktoré sa nám hodia</a:t>
-            </a:r>
-          </a:p>
-          <a:p>
-            <a:endParaRPr lang="sk-SK" dirty="0"/>
-          </a:p>
-          <a:p>
-            <a:pPr marL="0" indent="0">
-              <a:buNone/>
-            </a:pPr>
-            <a:r>
-              <a:rPr lang="sk-SK" b="1" dirty="0" err="1" smtClean="0"/>
-              <a:t>Extract</a:t>
-            </a:r>
-            <a:r>
-              <a:rPr lang="sk-SK" dirty="0" smtClean="0"/>
-              <a:t> – vytiahnuť dáta zo zdrojových systémov</a:t>
-            </a:r>
-          </a:p>
-          <a:p>
-            <a:pPr marL="0" indent="0">
-              <a:buNone/>
-            </a:pPr>
-            <a:r>
-              <a:rPr lang="sk-SK" b="1" dirty="0" err="1" smtClean="0"/>
-              <a:t>Transform</a:t>
-            </a:r>
-            <a:r>
-              <a:rPr lang="sk-SK" dirty="0" smtClean="0"/>
-              <a:t> – Pospájať, opraviť / vyčistiť, skonsolidovať dáta do jednotnej formy</a:t>
-            </a:r>
-          </a:p>
-          <a:p>
-            <a:pPr marL="0" indent="0">
-              <a:buNone/>
-            </a:pPr>
-            <a:r>
-              <a:rPr lang="sk-SK" b="1" dirty="0" err="1" smtClean="0"/>
-              <a:t>Load</a:t>
-            </a:r>
-            <a:r>
-              <a:rPr lang="sk-SK" dirty="0" smtClean="0"/>
-              <a:t> – uložiť do podoby, ktorá sa nám najviac hodí na spracovanie</a:t>
-            </a:r>
-          </a:p>
-          <a:p>
-            <a:pPr marL="0" indent="0">
-              <a:buNone/>
-            </a:pPr>
-            <a:r>
-              <a:rPr lang="sk-SK" dirty="0"/>
-              <a:t>	</a:t>
+              <a:t>Zdroj obr.: </a:t>
+            </a:r>
+            <a:r>
+              <a:rPr lang="en-US" dirty="0" smtClean="0"/>
+              <a:t>https://en.wikipedia.org/wiki/Star_schema</a:t>
             </a:r>
             <a:endParaRPr lang="en-US" dirty="0"/>
           </a:p>
@@ -7666,7 +7107,7 @@
     </p:spTree>
     <p:extLst>
       <p:ext uri="{BB962C8B-B14F-4D97-AF65-F5344CB8AC3E}">
-        <p14:creationId xmlns:p14="http://schemas.microsoft.com/office/powerpoint/2010/main" val="1845490483"/>
+        <p14:creationId xmlns:p14="http://schemas.microsoft.com/office/powerpoint/2010/main" val="476748615"/>
       </p:ext>
     </p:extLst>
   </p:cSld>
@@ -7702,7 +7143,7 @@
       </p:grpSpPr>
       <p:sp>
         <p:nvSpPr>
-          <p:cNvPr id="2" name="Title 1"/>
+          <p:cNvPr id="4" name="Title 3"/>
           <p:cNvSpPr>
             <a:spLocks noGrp="1"/>
           </p:cNvSpPr>
@@ -7712,10 +7153,16 @@
         </p:nvSpPr>
         <p:spPr/>
         <p:txBody>
-          <a:bodyPr/>
-          <a:lstStyle/>
-          <a:p>
-            <a:endParaRPr lang="en-US"/>
+          <a:bodyPr>
+            <a:normAutofit/>
+          </a:bodyPr>
+          <a:lstStyle/>
+          <a:p>
+            <a:r>
+              <a:rPr lang="sk-SK" sz="4400" dirty="0" smtClean="0"/>
+              <a:t>My ale teraz zostaneme na úrovni niekoľko málo tabuliek</a:t>
+            </a:r>
+            <a:endParaRPr lang="en-US" sz="4400" dirty="0"/>
           </a:p>
         </p:txBody>
       </p:sp>
@@ -7726,73 +7173,14 @@
             <a:spLocks noGrp="1"/>
           </p:cNvSpPr>
           <p:nvPr>
-            <p:ph idx="1"/>
-          </p:nvPr>
-        </p:nvSpPr>
-        <p:spPr/>
-        <p:txBody>
-          <a:bodyPr/>
-          <a:lstStyle/>
-          <a:p>
-            <a:r>
-              <a:rPr lang="sk-SK" dirty="0" smtClean="0"/>
-              <a:t>V praxi veľké, komplikované systémy prepájajúce množstvo rôznorodých zdrojov</a:t>
-            </a:r>
-          </a:p>
-          <a:p>
-            <a:r>
-              <a:rPr lang="sk-SK" dirty="0" smtClean="0"/>
-              <a:t>SQL procedúry, transformácie pomocou skriptov, </a:t>
-            </a:r>
-            <a:r>
-              <a:rPr lang="sk-SK" dirty="0" err="1" smtClean="0"/>
-              <a:t>Message</a:t>
-            </a:r>
-            <a:r>
-              <a:rPr lang="sk-SK" dirty="0" smtClean="0"/>
-              <a:t> </a:t>
-            </a:r>
-            <a:r>
-              <a:rPr lang="sk-SK" dirty="0" err="1" smtClean="0"/>
-              <a:t>Queue</a:t>
-            </a:r>
-            <a:r>
-              <a:rPr lang="sk-SK" dirty="0" smtClean="0"/>
-              <a:t> (Kafka), </a:t>
-            </a:r>
-            <a:r>
-              <a:rPr lang="sk-SK" dirty="0" err="1" smtClean="0"/>
-              <a:t>Spark</a:t>
-            </a:r>
-            <a:endParaRPr lang="sk-SK" dirty="0" smtClean="0"/>
-          </a:p>
-          <a:p>
-            <a:r>
-              <a:rPr lang="sk-SK" dirty="0" smtClean="0"/>
-              <a:t>Výsledok sú tabuľky v nejakom distribuovanom súborovom systéme. Ideálne v podobe </a:t>
-            </a:r>
-            <a:r>
-              <a:rPr lang="sk-SK" dirty="0" err="1" smtClean="0"/>
-              <a:t>Star</a:t>
-            </a:r>
-            <a:r>
-              <a:rPr lang="sk-SK" dirty="0" smtClean="0"/>
-              <a:t>-schémy</a:t>
-            </a:r>
-          </a:p>
-          <a:p>
-            <a:r>
-              <a:rPr lang="sk-SK" dirty="0" smtClean="0"/>
-              <a:t>Dopytovanie najčastejšie pomocou SQL alebo </a:t>
-            </a:r>
-            <a:r>
-              <a:rPr lang="sk-SK" dirty="0" err="1" smtClean="0"/>
-              <a:t>MapReduce</a:t>
-            </a:r>
-            <a:r>
-              <a:rPr lang="sk-SK" dirty="0" smtClean="0"/>
-              <a:t> úloh (alebo jazyku prekladaného do MR úloh)</a:t>
-            </a:r>
+            <p:ph type="body" idx="1"/>
+          </p:nvPr>
+        </p:nvSpPr>
+        <p:spPr/>
+        <p:txBody>
+          <a:bodyPr/>
+          <a:lstStyle/>
+          <a:p>
             <a:endParaRPr lang="en-US" dirty="0"/>
           </a:p>
         </p:txBody>
@@ -7800,7 +7188,7 @@
     </p:spTree>
     <p:extLst>
       <p:ext uri="{BB962C8B-B14F-4D97-AF65-F5344CB8AC3E}">
-        <p14:creationId xmlns:p14="http://schemas.microsoft.com/office/powerpoint/2010/main" val="456617093"/>
+        <p14:creationId xmlns:p14="http://schemas.microsoft.com/office/powerpoint/2010/main" val="2387385476"/>
       </p:ext>
     </p:extLst>
   </p:cSld>

</xml_diff>